<commit_message>
added program structure section
</commit_message>
<xml_diff>
--- a/cobol/cobol.pptx
+++ b/cobol/cobol.pptx
@@ -5,14 +5,17 @@
     <p:sldMasterId id="2147483660" r:id="rId4"/>
   </p:sldMasterIdLst>
   <p:notesMasterIdLst>
-    <p:notesMasterId r:id="rId10"/>
+    <p:notesMasterId r:id="rId13"/>
   </p:notesMasterIdLst>
   <p:sldIdLst>
     <p:sldId id="278" r:id="rId5"/>
     <p:sldId id="279" r:id="rId6"/>
-    <p:sldId id="280" r:id="rId7"/>
-    <p:sldId id="281" r:id="rId8"/>
-    <p:sldId id="282" r:id="rId9"/>
+    <p:sldId id="284" r:id="rId7"/>
+    <p:sldId id="280" r:id="rId8"/>
+    <p:sldId id="281" r:id="rId9"/>
+    <p:sldId id="282" r:id="rId10"/>
+    <p:sldId id="283" r:id="rId11"/>
+    <p:sldId id="285" r:id="rId12"/>
   </p:sldIdLst>
   <p:sldSz cx="12192000" cy="6858000"/>
   <p:notesSz cx="6858000" cy="9144000"/>
@@ -112,6 +115,30 @@
     </a:lvl9pPr>
   </p:defaultTextStyle>
   <p:extLst>
+    <p:ext uri="{521415D9-36F7-43E2-AB2F-B90AF26B5E84}">
+      <p14:sectionLst xmlns:p14="http://schemas.microsoft.com/office/powerpoint/2010/main">
+        <p14:section name="Intro" id="{F0424F06-A07E-46DE-9D2E-2C7522B3CE79}">
+          <p14:sldIdLst>
+            <p14:sldId id="278"/>
+            <p14:sldId id="279"/>
+          </p14:sldIdLst>
+        </p14:section>
+        <p14:section name="Historical Background" id="{A7027D08-F243-4225-A04C-72E1C08F76EC}">
+          <p14:sldIdLst>
+            <p14:sldId id="284"/>
+            <p14:sldId id="280"/>
+            <p14:sldId id="281"/>
+            <p14:sldId id="282"/>
+          </p14:sldIdLst>
+        </p14:section>
+        <p14:section name="Program Structure" id="{A462004D-8876-4507-9076-ABCD9BA00CF2}">
+          <p14:sldIdLst>
+            <p14:sldId id="283"/>
+            <p14:sldId id="285"/>
+          </p14:sldIdLst>
+        </p14:section>
+      </p14:sectionLst>
+    </p:ext>
     <p:ext uri="{EFAFB233-063F-42B5-8137-9DF3F51BA10A}">
       <p15:sldGuideLst xmlns:p15="http://schemas.microsoft.com/office/powerpoint/2012/main"/>
     </p:ext>
@@ -201,7 +228,7 @@
           <a:p>
             <a:fld id="{AFD01546-198A-4195-BCF8-F0FF54C90E5E}" type="datetimeFigureOut">
               <a:rPr lang="en-US" smtClean="0"/>
-              <a:t>11/30/2025</a:t>
+              <a:t>12/1/2025</a:t>
             </a:fld>
             <a:endParaRPr lang="en-US" dirty="0"/>
           </a:p>
@@ -797,7 +824,7 @@
           <a:p>
             <a:fld id="{88D38747-4367-4BD2-8D51-C97E202738E2}" type="datetime1">
               <a:rPr lang="en-US" smtClean="0"/>
-              <a:t>11/30/2025</a:t>
+              <a:t>12/1/2025</a:t>
             </a:fld>
             <a:endParaRPr lang="en-US" dirty="0"/>
           </a:p>
@@ -1102,7 +1129,7 @@
           <a:p>
             <a:fld id="{11F1B079-7EF0-44EE-B798-BCC497C9F3B2}" type="datetime1">
               <a:rPr lang="en-US" smtClean="0"/>
-              <a:t>11/30/2025</a:t>
+              <a:t>12/1/2025</a:t>
             </a:fld>
             <a:endParaRPr lang="en-US" dirty="0"/>
           </a:p>
@@ -1296,7 +1323,7 @@
           <a:p>
             <a:fld id="{28FF70A8-1D13-4657-95F0-A9EA54967B8D}" type="datetime1">
               <a:rPr lang="en-US" smtClean="0"/>
-              <a:t>11/30/2025</a:t>
+              <a:t>12/1/2025</a:t>
             </a:fld>
             <a:endParaRPr lang="en-US" dirty="0"/>
           </a:p>
@@ -1559,7 +1586,7 @@
           <a:p>
             <a:fld id="{21EB90AC-71BD-4C7F-8ACA-7B3F18292E63}" type="datetime1">
               <a:rPr lang="en-US" smtClean="0"/>
-              <a:t>11/30/2025</a:t>
+              <a:t>12/1/2025</a:t>
             </a:fld>
             <a:endParaRPr lang="en-US" dirty="0"/>
           </a:p>
@@ -1995,7 +2022,7 @@
           <a:p>
             <a:fld id="{4E6EFC2C-8905-46F0-B443-CE905B76BA01}" type="datetime1">
               <a:rPr lang="en-US" smtClean="0"/>
-              <a:t>11/30/2025</a:t>
+              <a:t>12/1/2025</a:t>
             </a:fld>
             <a:endParaRPr lang="en-US" dirty="0"/>
           </a:p>
@@ -2532,7 +2559,7 @@
           <a:p>
             <a:fld id="{D9079DC3-C9B5-499E-9140-0DC28B7074E2}" type="datetime1">
               <a:rPr lang="en-US" smtClean="0"/>
-              <a:t>11/30/2025</a:t>
+              <a:t>12/1/2025</a:t>
             </a:fld>
             <a:endParaRPr lang="en-US" dirty="0"/>
           </a:p>
@@ -3414,7 +3441,7 @@
           <a:p>
             <a:fld id="{30BB33EA-E472-4D22-9C03-A9C14AA21CED}" type="datetime1">
               <a:rPr lang="en-US" smtClean="0"/>
-              <a:t>11/30/2025</a:t>
+              <a:t>12/1/2025</a:t>
             </a:fld>
             <a:endParaRPr lang="en-US" dirty="0"/>
           </a:p>
@@ -3584,7 +3611,7 @@
           <a:p>
             <a:fld id="{73C55A3C-5767-4844-A0A3-83778C2E5409}" type="datetime1">
               <a:rPr lang="en-US" smtClean="0"/>
-              <a:t>11/30/2025</a:t>
+              <a:t>12/1/2025</a:t>
             </a:fld>
             <a:endParaRPr lang="en-US" dirty="0"/>
           </a:p>
@@ -3828,7 +3855,7 @@
           <a:p>
             <a:fld id="{CAE507A8-A5CF-4D38-AB86-7EDDA87A85D4}" type="datetime1">
               <a:rPr lang="en-US" smtClean="0"/>
-              <a:t>11/30/2025</a:t>
+              <a:t>12/1/2025</a:t>
             </a:fld>
             <a:endParaRPr lang="en-US" dirty="0"/>
           </a:p>
@@ -4070,7 +4097,7 @@
           <a:p>
             <a:fld id="{BDFCD27C-8599-43EF-BA1D-14DDC1946E06}" type="datetime1">
               <a:rPr lang="en-US" smtClean="0"/>
-              <a:t>11/30/2025</a:t>
+              <a:t>12/1/2025</a:t>
             </a:fld>
             <a:endParaRPr lang="en-US" dirty="0"/>
           </a:p>
@@ -4553,7 +4580,7 @@
           <a:p>
             <a:fld id="{49343D99-809A-49C0-96E5-4250D0B498EE}" type="datetime1">
               <a:rPr lang="en-US" smtClean="0"/>
-              <a:t>11/30/2025</a:t>
+              <a:t>12/1/2025</a:t>
             </a:fld>
             <a:endParaRPr lang="en-US" dirty="0"/>
           </a:p>
@@ -4671,7 +4698,7 @@
           <a:p>
             <a:fld id="{A143DE9B-B678-4EFB-BB7D-A4370204A0B0}" type="datetime1">
               <a:rPr lang="en-US" smtClean="0"/>
-              <a:t>11/30/2025</a:t>
+              <a:t>12/1/2025</a:t>
             </a:fld>
             <a:endParaRPr lang="en-US" dirty="0"/>
           </a:p>
@@ -4766,7 +4793,7 @@
           <a:p>
             <a:fld id="{E68812DA-F765-4142-A6A3-A8ED7235E082}" type="datetime1">
               <a:rPr lang="en-US" smtClean="0"/>
-              <a:t>11/30/2025</a:t>
+              <a:t>12/1/2025</a:t>
             </a:fld>
             <a:endParaRPr lang="en-US" dirty="0"/>
           </a:p>
@@ -5021,7 +5048,7 @@
           <a:p>
             <a:fld id="{3E0277FD-7DE6-41D4-930D-AC99F5AFE54E}" type="datetime1">
               <a:rPr lang="en-US" smtClean="0"/>
-              <a:t>11/30/2025</a:t>
+              <a:t>12/1/2025</a:t>
             </a:fld>
             <a:endParaRPr lang="en-US" dirty="0"/>
           </a:p>
@@ -5328,7 +5355,7 @@
           <a:p>
             <a:fld id="{9EA15526-7079-4B7B-987C-1B5FAE11A0FF}" type="datetime1">
               <a:rPr lang="en-US" smtClean="0"/>
-              <a:t>11/30/2025</a:t>
+              <a:t>12/1/2025</a:t>
             </a:fld>
             <a:endParaRPr lang="en-US" dirty="0"/>
           </a:p>
@@ -5563,7 +5590,7 @@
           <a:p>
             <a:fld id="{073ED0CC-082F-4160-86E5-0D6041F12778}" type="datetime1">
               <a:rPr lang="en-US" smtClean="0"/>
-              <a:t>11/30/2025</a:t>
+              <a:t>12/1/2025</a:t>
             </a:fld>
             <a:endParaRPr lang="en-US" dirty="0"/>
           </a:p>
@@ -6481,7 +6508,7 @@
           </a:effectLst>
           <a:extLst>
             <a:ext uri="{91240B29-F687-4f45-9708-019B960494DF}">
-              <a14:hiddenLine xmlns:a16="http://schemas.microsoft.com/office/drawing/2014/main" xmlns:p14="http://schemas.microsoft.com/office/powerpoint/2010/main" xmlns:a14="http://schemas.microsoft.com/office/drawing/2010/main" xmlns="" w="9525">
+              <a14:hiddenLine xmlns="" xmlns:a14="http://schemas.microsoft.com/office/drawing/2010/main" xmlns:p14="http://schemas.microsoft.com/office/powerpoint/2010/main" xmlns:a16="http://schemas.microsoft.com/office/drawing/2014/main" w="9525">
                 <a:solidFill>
                   <a:srgbClr val="000000"/>
                 </a:solidFill>
@@ -6745,8 +6772,8 @@
         </p:blipFill>
         <p:spPr>
           <a:xfrm>
-            <a:off x="-8622" y="10"/>
-            <a:ext cx="6096000" cy="6857990"/>
+            <a:off x="-8623" y="10"/>
+            <a:ext cx="6265647" cy="6857990"/>
           </a:xfrm>
           <a:prstGeom prst="rect">
             <a:avLst/>
@@ -6884,7 +6911,7 @@
             </a:pPr>
             <a:r>
               <a:rPr lang="en-US" sz="2400" dirty="0"/>
-              <a:t>Explanation of Solution Code </a:t>
+              <a:t>Explanation of Solution Code (Stack Implementation)</a:t>
             </a:r>
           </a:p>
         </p:txBody>
@@ -6903,6 +6930,182 @@
 </file>
 
 <file path=ppt/slides/slide3.xml><?xml version="1.0" encoding="utf-8"?>
+<p:sld xmlns:a="http://schemas.openxmlformats.org/drawingml/2006/main" xmlns:r="http://schemas.openxmlformats.org/officeDocument/2006/relationships" xmlns:p="http://schemas.openxmlformats.org/presentationml/2006/main">
+  <p:cSld>
+    <p:bg>
+      <p:bgPr>
+        <a:blipFill rotWithShape="1">
+          <a:blip r:embed="rId2">
+            <a:duotone>
+              <a:schemeClr val="bg1">
+                <a:shade val="80000"/>
+                <a:lumMod val="80000"/>
+              </a:schemeClr>
+              <a:schemeClr val="bg1">
+                <a:tint val="98000"/>
+              </a:schemeClr>
+            </a:duotone>
+          </a:blip>
+          <a:stretch/>
+        </a:blipFill>
+        <a:effectLst/>
+      </p:bgPr>
+    </p:bg>
+    <p:spTree>
+      <p:nvGrpSpPr>
+        <p:cNvPr id="1" name=""/>
+        <p:cNvGrpSpPr/>
+        <p:nvPr/>
+      </p:nvGrpSpPr>
+      <p:grpSpPr>
+        <a:xfrm>
+          <a:off x="0" y="0"/>
+          <a:ext cx="0" cy="0"/>
+          <a:chOff x="0" y="0"/>
+          <a:chExt cx="0" cy="0"/>
+        </a:xfrm>
+      </p:grpSpPr>
+      <p:sp useBgFill="1">
+        <p:nvSpPr>
+          <p:cNvPr id="9" name="Rectangle 8">
+            <a:extLst>
+              <a:ext uri="{FF2B5EF4-FFF2-40B4-BE49-F238E27FC236}">
+                <a16:creationId xmlns:a16="http://schemas.microsoft.com/office/drawing/2014/main" id="{BD32A07D-C646-4CC0-BA93-76707E707231}"/>
+              </a:ext>
+              <a:ext uri="{C183D7F6-B498-43B3-948B-1728B52AA6E4}">
+                <adec:decorative xmlns:adec="http://schemas.microsoft.com/office/drawing/2017/decorative" val="1"/>
+              </a:ext>
+            </a:extLst>
+          </p:cNvPr>
+          <p:cNvSpPr>
+            <a:spLocks noGrp="1" noRot="1" noChangeAspect="1" noMove="1" noResize="1" noEditPoints="1" noAdjustHandles="1" noChangeArrowheads="1" noChangeShapeType="1" noTextEdit="1"/>
+          </p:cNvSpPr>
+          <p:nvPr>
+            <p:extLst>
+              <p:ext uri="{386F3935-93C4-4BCD-93E2-E3B085C9AB24}">
+                <p16:designElem xmlns:p16="http://schemas.microsoft.com/office/powerpoint/2015/main" val="1"/>
+              </p:ext>
+            </p:extLst>
+          </p:nvPr>
+        </p:nvSpPr>
+        <p:spPr>
+          <a:xfrm>
+            <a:off x="0" y="0"/>
+            <a:ext cx="12192000" cy="6858000"/>
+          </a:xfrm>
+          <a:prstGeom prst="rect">
+            <a:avLst/>
+          </a:prstGeom>
+          <a:ln>
+            <a:noFill/>
+          </a:ln>
+        </p:spPr>
+        <p:style>
+          <a:lnRef idx="2">
+            <a:schemeClr val="accent1">
+              <a:shade val="50000"/>
+            </a:schemeClr>
+          </a:lnRef>
+          <a:fillRef idx="1">
+            <a:schemeClr val="accent1"/>
+          </a:fillRef>
+          <a:effectRef idx="0">
+            <a:schemeClr val="accent1"/>
+          </a:effectRef>
+          <a:fontRef idx="minor">
+            <a:schemeClr val="lt1"/>
+          </a:fontRef>
+        </p:style>
+        <p:txBody>
+          <a:bodyPr rtlCol="0" anchor="ctr"/>
+          <a:lstStyle/>
+          <a:p>
+            <a:pPr algn="ctr"/>
+            <a:endParaRPr lang="en-US"/>
+          </a:p>
+        </p:txBody>
+      </p:sp>
+      <p:sp>
+        <p:nvSpPr>
+          <p:cNvPr id="2" name="Title 1">
+            <a:extLst>
+              <a:ext uri="{FF2B5EF4-FFF2-40B4-BE49-F238E27FC236}">
+                <a16:creationId xmlns:a16="http://schemas.microsoft.com/office/drawing/2014/main" id="{18A86A80-B332-7A3B-B494-D40AC4A86087}"/>
+              </a:ext>
+            </a:extLst>
+          </p:cNvPr>
+          <p:cNvSpPr>
+            <a:spLocks noGrp="1"/>
+          </p:cNvSpPr>
+          <p:nvPr>
+            <p:ph type="title"/>
+          </p:nvPr>
+        </p:nvSpPr>
+        <p:spPr>
+          <a:xfrm>
+            <a:off x="7947377" y="835383"/>
+            <a:ext cx="3382832" cy="3499549"/>
+          </a:xfrm>
+        </p:spPr>
+        <p:txBody>
+          <a:bodyPr vert="horz" lIns="91440" tIns="45720" rIns="91440" bIns="45720" rtlCol="0" anchor="b">
+            <a:normAutofit/>
+          </a:bodyPr>
+          <a:lstStyle/>
+          <a:p>
+            <a:pPr algn="l"/>
+            <a:r>
+              <a:rPr lang="en-US" sz="4200" dirty="0"/>
+              <a:t>Historical Background</a:t>
+            </a:r>
+          </a:p>
+        </p:txBody>
+      </p:sp>
+      <p:pic>
+        <p:nvPicPr>
+          <p:cNvPr id="5" name="Picture 4" descr="A gold mandala on a red background">
+            <a:extLst>
+              <a:ext uri="{FF2B5EF4-FFF2-40B4-BE49-F238E27FC236}">
+                <a16:creationId xmlns:a16="http://schemas.microsoft.com/office/drawing/2014/main" id="{53197A5D-EFF5-21B0-657B-142CA44F95CE}"/>
+              </a:ext>
+            </a:extLst>
+          </p:cNvPr>
+          <p:cNvPicPr>
+            <a:picLocks noChangeAspect="1"/>
+          </p:cNvPicPr>
+          <p:nvPr/>
+        </p:nvPicPr>
+        <p:blipFill>
+          <a:blip r:embed="rId3"/>
+          <a:srcRect r="17567"/>
+          <a:stretch>
+            <a:fillRect/>
+          </a:stretch>
+        </p:blipFill>
+        <p:spPr>
+          <a:xfrm>
+            <a:off x="-1" y="10"/>
+            <a:ext cx="7537704" cy="6857990"/>
+          </a:xfrm>
+          <a:prstGeom prst="rect">
+            <a:avLst/>
+          </a:prstGeom>
+        </p:spPr>
+      </p:pic>
+    </p:spTree>
+    <p:extLst>
+      <p:ext uri="{BB962C8B-B14F-4D97-AF65-F5344CB8AC3E}">
+        <p14:creationId xmlns:p14="http://schemas.microsoft.com/office/powerpoint/2010/main" val="3653703368"/>
+      </p:ext>
+    </p:extLst>
+  </p:cSld>
+  <p:clrMapOvr>
+    <a:masterClrMapping/>
+  </p:clrMapOvr>
+</p:sld>
+</file>
+
+<file path=ppt/slides/slide4.xml><?xml version="1.0" encoding="utf-8"?>
 <p:sld xmlns:a="http://schemas.openxmlformats.org/drawingml/2006/main" xmlns:r="http://schemas.openxmlformats.org/officeDocument/2006/relationships" xmlns:p="http://schemas.openxmlformats.org/presentationml/2006/main">
   <p:cSld>
     <p:bg>
@@ -7192,7 +7395,7 @@
 </p:sld>
 </file>
 
-<file path=ppt/slides/slide4.xml><?xml version="1.0" encoding="utf-8"?>
+<file path=ppt/slides/slide5.xml><?xml version="1.0" encoding="utf-8"?>
 <p:sld xmlns:a="http://schemas.openxmlformats.org/drawingml/2006/main" xmlns:r="http://schemas.openxmlformats.org/officeDocument/2006/relationships" xmlns:p="http://schemas.openxmlformats.org/presentationml/2006/main">
   <p:cSld>
     <p:bg>
@@ -7449,7 +7652,7 @@
 </p:sld>
 </file>
 
-<file path=ppt/slides/slide5.xml><?xml version="1.0" encoding="utf-8"?>
+<file path=ppt/slides/slide6.xml><?xml version="1.0" encoding="utf-8"?>
 <p:sld xmlns:a="http://schemas.openxmlformats.org/drawingml/2006/main" xmlns:r="http://schemas.openxmlformats.org/officeDocument/2006/relationships" xmlns:p="http://schemas.openxmlformats.org/presentationml/2006/main">
   <p:cSld>
     <p:bg>
@@ -7709,6 +7912,1063 @@
     <p:extLst>
       <p:ext uri="{BB962C8B-B14F-4D97-AF65-F5344CB8AC3E}">
         <p14:creationId xmlns:p14="http://schemas.microsoft.com/office/powerpoint/2010/main" val="2532603134"/>
+      </p:ext>
+    </p:extLst>
+  </p:cSld>
+  <p:clrMapOvr>
+    <a:masterClrMapping/>
+  </p:clrMapOvr>
+</p:sld>
+</file>
+
+<file path=ppt/slides/slide7.xml><?xml version="1.0" encoding="utf-8"?>
+<p:sld xmlns:a="http://schemas.openxmlformats.org/drawingml/2006/main" xmlns:r="http://schemas.openxmlformats.org/officeDocument/2006/relationships" xmlns:p="http://schemas.openxmlformats.org/presentationml/2006/main">
+  <p:cSld>
+    <p:bg>
+      <p:bgPr>
+        <a:blipFill rotWithShape="1">
+          <a:blip r:embed="rId2">
+            <a:duotone>
+              <a:schemeClr val="bg1">
+                <a:shade val="80000"/>
+                <a:lumMod val="80000"/>
+              </a:schemeClr>
+              <a:schemeClr val="bg1">
+                <a:tint val="98000"/>
+              </a:schemeClr>
+            </a:duotone>
+          </a:blip>
+          <a:stretch/>
+        </a:blipFill>
+        <a:effectLst/>
+      </p:bgPr>
+    </p:bg>
+    <p:spTree>
+      <p:nvGrpSpPr>
+        <p:cNvPr id="1" name=""/>
+        <p:cNvGrpSpPr/>
+        <p:nvPr/>
+      </p:nvGrpSpPr>
+      <p:grpSpPr>
+        <a:xfrm>
+          <a:off x="0" y="0"/>
+          <a:ext cx="0" cy="0"/>
+          <a:chOff x="0" y="0"/>
+          <a:chExt cx="0" cy="0"/>
+        </a:xfrm>
+      </p:grpSpPr>
+      <p:sp useBgFill="1">
+        <p:nvSpPr>
+          <p:cNvPr id="1038" name="Rectangle 1037">
+            <a:extLst>
+              <a:ext uri="{FF2B5EF4-FFF2-40B4-BE49-F238E27FC236}">
+                <a16:creationId xmlns:a16="http://schemas.microsoft.com/office/drawing/2014/main" id="{766CDA4A-6CAA-4FED-A424-FF9D363E93C1}"/>
+              </a:ext>
+              <a:ext uri="{C183D7F6-B498-43B3-948B-1728B52AA6E4}">
+                <adec:decorative xmlns:adec="http://schemas.microsoft.com/office/drawing/2017/decorative" val="1"/>
+              </a:ext>
+            </a:extLst>
+          </p:cNvPr>
+          <p:cNvSpPr>
+            <a:spLocks noGrp="1" noRot="1" noChangeAspect="1" noMove="1" noResize="1" noEditPoints="1" noAdjustHandles="1" noChangeArrowheads="1" noChangeShapeType="1" noTextEdit="1"/>
+          </p:cNvSpPr>
+          <p:nvPr>
+            <p:extLst>
+              <p:ext uri="{386F3935-93C4-4BCD-93E2-E3B085C9AB24}">
+                <p16:designElem xmlns:p16="http://schemas.microsoft.com/office/powerpoint/2015/main" val="1"/>
+              </p:ext>
+            </p:extLst>
+          </p:nvPr>
+        </p:nvSpPr>
+        <p:spPr>
+          <a:xfrm>
+            <a:off x="0" y="0"/>
+            <a:ext cx="12192000" cy="6858000"/>
+          </a:xfrm>
+          <a:prstGeom prst="rect">
+            <a:avLst/>
+          </a:prstGeom>
+          <a:ln>
+            <a:noFill/>
+          </a:ln>
+        </p:spPr>
+        <p:style>
+          <a:lnRef idx="2">
+            <a:schemeClr val="accent1">
+              <a:shade val="50000"/>
+            </a:schemeClr>
+          </a:lnRef>
+          <a:fillRef idx="1">
+            <a:schemeClr val="accent1"/>
+          </a:fillRef>
+          <a:effectRef idx="0">
+            <a:schemeClr val="accent1"/>
+          </a:effectRef>
+          <a:fontRef idx="minor">
+            <a:schemeClr val="lt1"/>
+          </a:fontRef>
+        </p:style>
+        <p:txBody>
+          <a:bodyPr rtlCol="0" anchor="ctr"/>
+          <a:lstStyle/>
+          <a:p>
+            <a:pPr algn="ctr"/>
+            <a:endParaRPr lang="en-US"/>
+          </a:p>
+        </p:txBody>
+      </p:sp>
+      <p:sp>
+        <p:nvSpPr>
+          <p:cNvPr id="2" name="Title 1">
+            <a:extLst>
+              <a:ext uri="{FF2B5EF4-FFF2-40B4-BE49-F238E27FC236}">
+                <a16:creationId xmlns:a16="http://schemas.microsoft.com/office/drawing/2014/main" id="{A15DA5DA-6F90-88EC-E73A-7C033C895C55}"/>
+              </a:ext>
+            </a:extLst>
+          </p:cNvPr>
+          <p:cNvSpPr>
+            <a:spLocks noGrp="1"/>
+          </p:cNvSpPr>
+          <p:nvPr>
+            <p:ph type="title"/>
+          </p:nvPr>
+        </p:nvSpPr>
+        <p:spPr>
+          <a:xfrm>
+            <a:off x="1370693" y="4435229"/>
+            <a:ext cx="9440034" cy="1059644"/>
+          </a:xfrm>
+        </p:spPr>
+        <p:txBody>
+          <a:bodyPr vert="horz" lIns="91440" tIns="45720" rIns="91440" bIns="45720" rtlCol="0" anchor="b">
+            <a:normAutofit/>
+          </a:bodyPr>
+          <a:lstStyle/>
+          <a:p>
+            <a:r>
+              <a:rPr lang="en-US" sz="4800" dirty="0"/>
+              <a:t>COBOL Program Structure</a:t>
+            </a:r>
+          </a:p>
+        </p:txBody>
+      </p:sp>
+      <p:pic>
+        <p:nvPicPr>
+          <p:cNvPr id="1040" name="Picture 1039">
+            <a:extLst>
+              <a:ext uri="{FF2B5EF4-FFF2-40B4-BE49-F238E27FC236}">
+                <a16:creationId xmlns:a16="http://schemas.microsoft.com/office/drawing/2014/main" id="{9B0DB875-49E3-4B9D-8AAE-D81A127B6647}"/>
+              </a:ext>
+              <a:ext uri="{C183D7F6-B498-43B3-948B-1728B52AA6E4}">
+                <adec:decorative xmlns:adec="http://schemas.microsoft.com/office/drawing/2017/decorative" val="1"/>
+              </a:ext>
+            </a:extLst>
+          </p:cNvPr>
+          <p:cNvPicPr>
+            <a:picLocks noGrp="1" noRot="1" noChangeAspect="1" noMove="1" noResize="1" noEditPoints="1" noAdjustHandles="1" noChangeArrowheads="1" noChangeShapeType="1" noCrop="1"/>
+          </p:cNvPicPr>
+          <p:nvPr>
+            <p:extLst>
+              <p:ext uri="{386F3935-93C4-4BCD-93E2-E3B085C9AB24}">
+                <p16:designElem xmlns:p16="http://schemas.microsoft.com/office/powerpoint/2015/main" val="1"/>
+              </p:ext>
+            </p:extLst>
+          </p:nvPr>
+        </p:nvPicPr>
+        <p:blipFill>
+          <a:blip r:embed="rId3">
+            <a:extLst>
+              <a:ext uri="{28A0092B-C50C-407E-A947-70E740481C1C}">
+                <a14:useLocalDpi xmlns:a14="http://schemas.microsoft.com/office/drawing/2010/main" val="0"/>
+              </a:ext>
+            </a:extLst>
+          </a:blip>
+          <a:stretch>
+            <a:fillRect/>
+          </a:stretch>
+        </p:blipFill>
+        <p:spPr>
+          <a:xfrm>
+            <a:off x="1013883" y="547807"/>
+            <a:ext cx="10141799" cy="3816806"/>
+          </a:xfrm>
+          <a:prstGeom prst="rect">
+            <a:avLst/>
+          </a:prstGeom>
+        </p:spPr>
+      </p:pic>
+      <p:pic>
+        <p:nvPicPr>
+          <p:cNvPr id="1026" name="Picture 2" descr="7 cobol examples with explanations. | by Yvan Scher | Medium">
+            <a:extLst>
+              <a:ext uri="{FF2B5EF4-FFF2-40B4-BE49-F238E27FC236}">
+                <a16:creationId xmlns:a16="http://schemas.microsoft.com/office/drawing/2014/main" id="{CD6913E6-BCB4-CB8E-A9F1-73FDF94DE987}"/>
+              </a:ext>
+            </a:extLst>
+          </p:cNvPr>
+          <p:cNvPicPr>
+            <a:picLocks noChangeAspect="1" noChangeArrowheads="1"/>
+          </p:cNvPicPr>
+          <p:nvPr/>
+        </p:nvPicPr>
+        <p:blipFill>
+          <a:blip r:embed="rId4">
+            <a:extLst>
+              <a:ext uri="{28A0092B-C50C-407E-A947-70E740481C1C}">
+                <a14:useLocalDpi xmlns:a14="http://schemas.microsoft.com/office/drawing/2010/main" val="0"/>
+              </a:ext>
+            </a:extLst>
+          </a:blip>
+          <a:srcRect t="6518" r="-1" b="17288"/>
+          <a:stretch>
+            <a:fillRect/>
+          </a:stretch>
+        </p:blipFill>
+        <p:spPr bwMode="auto">
+          <a:xfrm>
+            <a:off x="1169349" y="695008"/>
+            <a:ext cx="9845346" cy="3525671"/>
+          </a:xfrm>
+          <a:prstGeom prst="rect">
+            <a:avLst/>
+          </a:prstGeom>
+          <a:noFill/>
+          <a:extLst>
+            <a:ext uri="{909E8E84-426E-40DD-AFC4-6F175D3DCCD1}">
+              <a14:hiddenFill xmlns:a14="http://schemas.microsoft.com/office/drawing/2010/main">
+                <a:solidFill>
+                  <a:srgbClr val="FFFFFF"/>
+                </a:solidFill>
+              </a14:hiddenFill>
+            </a:ext>
+          </a:extLst>
+        </p:spPr>
+      </p:pic>
+    </p:spTree>
+    <p:extLst>
+      <p:ext uri="{BB962C8B-B14F-4D97-AF65-F5344CB8AC3E}">
+        <p14:creationId xmlns:p14="http://schemas.microsoft.com/office/powerpoint/2010/main" val="3857196131"/>
+      </p:ext>
+    </p:extLst>
+  </p:cSld>
+  <p:clrMapOvr>
+    <a:masterClrMapping/>
+  </p:clrMapOvr>
+</p:sld>
+</file>
+
+<file path=ppt/slides/slide8.xml><?xml version="1.0" encoding="utf-8"?>
+<p:sld xmlns:a="http://schemas.openxmlformats.org/drawingml/2006/main" xmlns:r="http://schemas.openxmlformats.org/officeDocument/2006/relationships" xmlns:p="http://schemas.openxmlformats.org/presentationml/2006/main">
+  <p:cSld>
+    <p:bg>
+      <p:bgPr>
+        <a:blipFill rotWithShape="1">
+          <a:blip r:embed="rId2">
+            <a:duotone>
+              <a:schemeClr val="bg1">
+                <a:shade val="80000"/>
+                <a:lumMod val="80000"/>
+              </a:schemeClr>
+              <a:schemeClr val="bg1">
+                <a:tint val="98000"/>
+              </a:schemeClr>
+            </a:duotone>
+          </a:blip>
+          <a:stretch/>
+        </a:blipFill>
+        <a:effectLst/>
+      </p:bgPr>
+    </p:bg>
+    <p:spTree>
+      <p:nvGrpSpPr>
+        <p:cNvPr id="1" name=""/>
+        <p:cNvGrpSpPr/>
+        <p:nvPr/>
+      </p:nvGrpSpPr>
+      <p:grpSpPr>
+        <a:xfrm>
+          <a:off x="0" y="0"/>
+          <a:ext cx="0" cy="0"/>
+          <a:chOff x="0" y="0"/>
+          <a:chExt cx="0" cy="0"/>
+        </a:xfrm>
+      </p:grpSpPr>
+      <p:sp>
+        <p:nvSpPr>
+          <p:cNvPr id="17" name="Rectangle 16">
+            <a:extLst>
+              <a:ext uri="{FF2B5EF4-FFF2-40B4-BE49-F238E27FC236}">
+                <a16:creationId xmlns:a16="http://schemas.microsoft.com/office/drawing/2014/main" id="{98761467-7640-47B1-90D4-04ADAD632C96}"/>
+              </a:ext>
+              <a:ext uri="{C183D7F6-B498-43B3-948B-1728B52AA6E4}">
+                <adec:decorative xmlns:adec="http://schemas.microsoft.com/office/drawing/2017/decorative" val="1"/>
+              </a:ext>
+            </a:extLst>
+          </p:cNvPr>
+          <p:cNvSpPr>
+            <a:spLocks noGrp="1" noRot="1" noChangeAspect="1" noMove="1" noResize="1" noEditPoints="1" noAdjustHandles="1" noChangeArrowheads="1" noChangeShapeType="1" noTextEdit="1"/>
+          </p:cNvSpPr>
+          <p:nvPr>
+            <p:extLst>
+              <p:ext uri="{386F3935-93C4-4BCD-93E2-E3B085C9AB24}">
+                <p16:designElem xmlns:p16="http://schemas.microsoft.com/office/powerpoint/2015/main" val="1"/>
+              </p:ext>
+            </p:extLst>
+          </p:nvPr>
+        </p:nvSpPr>
+        <p:spPr>
+          <a:xfrm>
+            <a:off x="0" y="0"/>
+            <a:ext cx="12192000" cy="6858000"/>
+          </a:xfrm>
+          <a:prstGeom prst="rect">
+            <a:avLst/>
+          </a:prstGeom>
+          <a:solidFill>
+            <a:schemeClr val="bg1">
+              <a:lumMod val="85000"/>
+              <a:lumOff val="15000"/>
+            </a:schemeClr>
+          </a:solidFill>
+          <a:ln>
+            <a:noFill/>
+          </a:ln>
+        </p:spPr>
+        <p:style>
+          <a:lnRef idx="2">
+            <a:schemeClr val="accent1">
+              <a:shade val="50000"/>
+            </a:schemeClr>
+          </a:lnRef>
+          <a:fillRef idx="1">
+            <a:schemeClr val="accent1"/>
+          </a:fillRef>
+          <a:effectRef idx="0">
+            <a:schemeClr val="accent1"/>
+          </a:effectRef>
+          <a:fontRef idx="minor">
+            <a:schemeClr val="lt1"/>
+          </a:fontRef>
+        </p:style>
+        <p:txBody>
+          <a:bodyPr rtlCol="0" anchor="ctr"/>
+          <a:lstStyle/>
+          <a:p>
+            <a:pPr algn="ctr"/>
+            <a:endParaRPr lang="en-US"/>
+          </a:p>
+        </p:txBody>
+      </p:sp>
+      <p:sp useBgFill="1">
+        <p:nvSpPr>
+          <p:cNvPr id="19" name="Freeform: Shape 18">
+            <a:extLst>
+              <a:ext uri="{FF2B5EF4-FFF2-40B4-BE49-F238E27FC236}">
+                <a16:creationId xmlns:a16="http://schemas.microsoft.com/office/drawing/2014/main" id="{738B1503-6FE9-46B4-9354-E943D91B11A3}"/>
+              </a:ext>
+              <a:ext uri="{C183D7F6-B498-43B3-948B-1728B52AA6E4}">
+                <adec:decorative xmlns:adec="http://schemas.microsoft.com/office/drawing/2017/decorative" val="1"/>
+              </a:ext>
+            </a:extLst>
+          </p:cNvPr>
+          <p:cNvSpPr>
+            <a:spLocks noGrp="1" noRot="1" noChangeAspect="1" noMove="1" noResize="1" noEditPoints="1" noAdjustHandles="1" noChangeArrowheads="1" noChangeShapeType="1" noTextEdit="1"/>
+          </p:cNvSpPr>
+          <p:nvPr>
+            <p:extLst>
+              <p:ext uri="{386F3935-93C4-4BCD-93E2-E3B085C9AB24}">
+                <p16:designElem xmlns:p16="http://schemas.microsoft.com/office/powerpoint/2015/main" val="1"/>
+              </p:ext>
+            </p:extLst>
+          </p:nvPr>
+        </p:nvSpPr>
+        <p:spPr>
+          <a:xfrm flipH="1">
+            <a:off x="3805514" y="-2"/>
+            <a:ext cx="8386486" cy="6858002"/>
+          </a:xfrm>
+          <a:custGeom>
+            <a:avLst/>
+            <a:gdLst>
+              <a:gd name="connsiteX0" fmla="*/ 0 w 6088489"/>
+              <a:gd name="connsiteY0" fmla="*/ 0 h 6858002"/>
+              <a:gd name="connsiteX1" fmla="*/ 3563332 w 6088489"/>
+              <a:gd name="connsiteY1" fmla="*/ 0 h 6858002"/>
+              <a:gd name="connsiteX2" fmla="*/ 3563332 w 6088489"/>
+              <a:gd name="connsiteY2" fmla="*/ 3 h 6858002"/>
+              <a:gd name="connsiteX3" fmla="*/ 5842099 w 6088489"/>
+              <a:gd name="connsiteY3" fmla="*/ 3 h 6858002"/>
+              <a:gd name="connsiteX4" fmla="*/ 5842099 w 6088489"/>
+              <a:gd name="connsiteY4" fmla="*/ 4 h 6858002"/>
+              <a:gd name="connsiteX5" fmla="*/ 5835346 w 6088489"/>
+              <a:gd name="connsiteY5" fmla="*/ 4 h 6858002"/>
+              <a:gd name="connsiteX6" fmla="*/ 5841229 w 6088489"/>
+              <a:gd name="connsiteY6" fmla="*/ 40466 h 6858002"/>
+              <a:gd name="connsiteX7" fmla="*/ 5858543 w 6088489"/>
+              <a:gd name="connsiteY7" fmla="*/ 159110 h 6858002"/>
+              <a:gd name="connsiteX8" fmla="*/ 5870645 w 6088489"/>
+              <a:gd name="connsiteY8" fmla="*/ 245521 h 6858002"/>
+              <a:gd name="connsiteX9" fmla="*/ 5883420 w 6088489"/>
+              <a:gd name="connsiteY9" fmla="*/ 348391 h 6858002"/>
+              <a:gd name="connsiteX10" fmla="*/ 5898716 w 6088489"/>
+              <a:gd name="connsiteY10" fmla="*/ 470463 h 6858002"/>
+              <a:gd name="connsiteX11" fmla="*/ 5914853 w 6088489"/>
+              <a:gd name="connsiteY11" fmla="*/ 605566 h 6858002"/>
+              <a:gd name="connsiteX12" fmla="*/ 5931830 w 6088489"/>
+              <a:gd name="connsiteY12" fmla="*/ 757813 h 6858002"/>
+              <a:gd name="connsiteX13" fmla="*/ 5949815 w 6088489"/>
+              <a:gd name="connsiteY13" fmla="*/ 923777 h 6858002"/>
+              <a:gd name="connsiteX14" fmla="*/ 5967801 w 6088489"/>
+              <a:gd name="connsiteY14" fmla="*/ 1104142 h 6858002"/>
+              <a:gd name="connsiteX15" fmla="*/ 5986122 w 6088489"/>
+              <a:gd name="connsiteY15" fmla="*/ 1296166 h 6858002"/>
+              <a:gd name="connsiteX16" fmla="*/ 6003099 w 6088489"/>
+              <a:gd name="connsiteY16" fmla="*/ 1503278 h 6858002"/>
+              <a:gd name="connsiteX17" fmla="*/ 6019404 w 6088489"/>
+              <a:gd name="connsiteY17" fmla="*/ 1719991 h 6858002"/>
+              <a:gd name="connsiteX18" fmla="*/ 6034196 w 6088489"/>
+              <a:gd name="connsiteY18" fmla="*/ 1949048 h 6858002"/>
+              <a:gd name="connsiteX19" fmla="*/ 6048315 w 6088489"/>
+              <a:gd name="connsiteY19" fmla="*/ 2187706 h 6858002"/>
+              <a:gd name="connsiteX20" fmla="*/ 6061595 w 6088489"/>
+              <a:gd name="connsiteY20" fmla="*/ 2436652 h 6858002"/>
+              <a:gd name="connsiteX21" fmla="*/ 6066301 w 6088489"/>
+              <a:gd name="connsiteY21" fmla="*/ 2564211 h 6858002"/>
+              <a:gd name="connsiteX22" fmla="*/ 6071512 w 6088489"/>
+              <a:gd name="connsiteY22" fmla="*/ 2694512 h 6858002"/>
+              <a:gd name="connsiteX23" fmla="*/ 6076386 w 6088489"/>
+              <a:gd name="connsiteY23" fmla="*/ 2826871 h 6858002"/>
+              <a:gd name="connsiteX24" fmla="*/ 6079580 w 6088489"/>
+              <a:gd name="connsiteY24" fmla="*/ 2959917 h 6858002"/>
+              <a:gd name="connsiteX25" fmla="*/ 6082438 w 6088489"/>
+              <a:gd name="connsiteY25" fmla="*/ 3095705 h 6858002"/>
+              <a:gd name="connsiteX26" fmla="*/ 6085463 w 6088489"/>
+              <a:gd name="connsiteY26" fmla="*/ 3232865 h 6858002"/>
+              <a:gd name="connsiteX27" fmla="*/ 6087480 w 6088489"/>
+              <a:gd name="connsiteY27" fmla="*/ 3372768 h 6858002"/>
+              <a:gd name="connsiteX28" fmla="*/ 6087480 w 6088489"/>
+              <a:gd name="connsiteY28" fmla="*/ 3514043 h 6858002"/>
+              <a:gd name="connsiteX29" fmla="*/ 6088489 w 6088489"/>
+              <a:gd name="connsiteY29" fmla="*/ 3656689 h 6858002"/>
+              <a:gd name="connsiteX30" fmla="*/ 6087480 w 6088489"/>
+              <a:gd name="connsiteY30" fmla="*/ 3800707 h 6858002"/>
+              <a:gd name="connsiteX31" fmla="*/ 6085463 w 6088489"/>
+              <a:gd name="connsiteY31" fmla="*/ 3946783 h 6858002"/>
+              <a:gd name="connsiteX32" fmla="*/ 6083614 w 6088489"/>
+              <a:gd name="connsiteY32" fmla="*/ 4092858 h 6858002"/>
+              <a:gd name="connsiteX33" fmla="*/ 6079580 w 6088489"/>
+              <a:gd name="connsiteY33" fmla="*/ 4240991 h 6858002"/>
+              <a:gd name="connsiteX34" fmla="*/ 6075378 w 6088489"/>
+              <a:gd name="connsiteY34" fmla="*/ 4390495 h 6858002"/>
+              <a:gd name="connsiteX35" fmla="*/ 6070503 w 6088489"/>
+              <a:gd name="connsiteY35" fmla="*/ 4540000 h 6858002"/>
+              <a:gd name="connsiteX36" fmla="*/ 6063612 w 6088489"/>
+              <a:gd name="connsiteY36" fmla="*/ 4690876 h 6858002"/>
+              <a:gd name="connsiteX37" fmla="*/ 6055375 w 6088489"/>
+              <a:gd name="connsiteY37" fmla="*/ 4843123 h 6858002"/>
+              <a:gd name="connsiteX38" fmla="*/ 6047475 w 6088489"/>
+              <a:gd name="connsiteY38" fmla="*/ 4996057 h 6858002"/>
+              <a:gd name="connsiteX39" fmla="*/ 6037390 w 6088489"/>
+              <a:gd name="connsiteY39" fmla="*/ 5148990 h 6858002"/>
+              <a:gd name="connsiteX40" fmla="*/ 6025287 w 6088489"/>
+              <a:gd name="connsiteY40" fmla="*/ 5303981 h 6858002"/>
+              <a:gd name="connsiteX41" fmla="*/ 6013185 w 6088489"/>
+              <a:gd name="connsiteY41" fmla="*/ 5456914 h 6858002"/>
+              <a:gd name="connsiteX42" fmla="*/ 5999233 w 6088489"/>
+              <a:gd name="connsiteY42" fmla="*/ 5612591 h 6858002"/>
+              <a:gd name="connsiteX43" fmla="*/ 5983937 w 6088489"/>
+              <a:gd name="connsiteY43" fmla="*/ 5768953 h 6858002"/>
+              <a:gd name="connsiteX44" fmla="*/ 5967801 w 6088489"/>
+              <a:gd name="connsiteY44" fmla="*/ 5923258 h 6858002"/>
+              <a:gd name="connsiteX45" fmla="*/ 5948975 w 6088489"/>
+              <a:gd name="connsiteY45" fmla="*/ 6079621 h 6858002"/>
+              <a:gd name="connsiteX46" fmla="*/ 5928804 w 6088489"/>
+              <a:gd name="connsiteY46" fmla="*/ 6235297 h 6858002"/>
+              <a:gd name="connsiteX47" fmla="*/ 5908801 w 6088489"/>
+              <a:gd name="connsiteY47" fmla="*/ 6391660 h 6858002"/>
+              <a:gd name="connsiteX48" fmla="*/ 5885437 w 6088489"/>
+              <a:gd name="connsiteY48" fmla="*/ 6547336 h 6858002"/>
+              <a:gd name="connsiteX49" fmla="*/ 5861568 w 6088489"/>
+              <a:gd name="connsiteY49" fmla="*/ 6702327 h 6858002"/>
+              <a:gd name="connsiteX50" fmla="*/ 5836524 w 6088489"/>
+              <a:gd name="connsiteY50" fmla="*/ 6858002 h 6858002"/>
+              <a:gd name="connsiteX51" fmla="*/ 3563332 w 6088489"/>
+              <a:gd name="connsiteY51" fmla="*/ 6858002 h 6858002"/>
+              <a:gd name="connsiteX52" fmla="*/ 1223490 w 6088489"/>
+              <a:gd name="connsiteY52" fmla="*/ 6858002 h 6858002"/>
+              <a:gd name="connsiteX53" fmla="*/ 0 w 6088489"/>
+              <a:gd name="connsiteY53" fmla="*/ 6858002 h 6858002"/>
+            </a:gdLst>
+            <a:ahLst/>
+            <a:cxnLst>
+              <a:cxn ang="0">
+                <a:pos x="connsiteX0" y="connsiteY0"/>
+              </a:cxn>
+              <a:cxn ang="0">
+                <a:pos x="connsiteX1" y="connsiteY1"/>
+              </a:cxn>
+              <a:cxn ang="0">
+                <a:pos x="connsiteX2" y="connsiteY2"/>
+              </a:cxn>
+              <a:cxn ang="0">
+                <a:pos x="connsiteX3" y="connsiteY3"/>
+              </a:cxn>
+              <a:cxn ang="0">
+                <a:pos x="connsiteX4" y="connsiteY4"/>
+              </a:cxn>
+              <a:cxn ang="0">
+                <a:pos x="connsiteX5" y="connsiteY5"/>
+              </a:cxn>
+              <a:cxn ang="0">
+                <a:pos x="connsiteX6" y="connsiteY6"/>
+              </a:cxn>
+              <a:cxn ang="0">
+                <a:pos x="connsiteX7" y="connsiteY7"/>
+              </a:cxn>
+              <a:cxn ang="0">
+                <a:pos x="connsiteX8" y="connsiteY8"/>
+              </a:cxn>
+              <a:cxn ang="0">
+                <a:pos x="connsiteX9" y="connsiteY9"/>
+              </a:cxn>
+              <a:cxn ang="0">
+                <a:pos x="connsiteX10" y="connsiteY10"/>
+              </a:cxn>
+              <a:cxn ang="0">
+                <a:pos x="connsiteX11" y="connsiteY11"/>
+              </a:cxn>
+              <a:cxn ang="0">
+                <a:pos x="connsiteX12" y="connsiteY12"/>
+              </a:cxn>
+              <a:cxn ang="0">
+                <a:pos x="connsiteX13" y="connsiteY13"/>
+              </a:cxn>
+              <a:cxn ang="0">
+                <a:pos x="connsiteX14" y="connsiteY14"/>
+              </a:cxn>
+              <a:cxn ang="0">
+                <a:pos x="connsiteX15" y="connsiteY15"/>
+              </a:cxn>
+              <a:cxn ang="0">
+                <a:pos x="connsiteX16" y="connsiteY16"/>
+              </a:cxn>
+              <a:cxn ang="0">
+                <a:pos x="connsiteX17" y="connsiteY17"/>
+              </a:cxn>
+              <a:cxn ang="0">
+                <a:pos x="connsiteX18" y="connsiteY18"/>
+              </a:cxn>
+              <a:cxn ang="0">
+                <a:pos x="connsiteX19" y="connsiteY19"/>
+              </a:cxn>
+              <a:cxn ang="0">
+                <a:pos x="connsiteX20" y="connsiteY20"/>
+              </a:cxn>
+              <a:cxn ang="0">
+                <a:pos x="connsiteX21" y="connsiteY21"/>
+              </a:cxn>
+              <a:cxn ang="0">
+                <a:pos x="connsiteX22" y="connsiteY22"/>
+              </a:cxn>
+              <a:cxn ang="0">
+                <a:pos x="connsiteX23" y="connsiteY23"/>
+              </a:cxn>
+              <a:cxn ang="0">
+                <a:pos x="connsiteX24" y="connsiteY24"/>
+              </a:cxn>
+              <a:cxn ang="0">
+                <a:pos x="connsiteX25" y="connsiteY25"/>
+              </a:cxn>
+              <a:cxn ang="0">
+                <a:pos x="connsiteX26" y="connsiteY26"/>
+              </a:cxn>
+              <a:cxn ang="0">
+                <a:pos x="connsiteX27" y="connsiteY27"/>
+              </a:cxn>
+              <a:cxn ang="0">
+                <a:pos x="connsiteX28" y="connsiteY28"/>
+              </a:cxn>
+              <a:cxn ang="0">
+                <a:pos x="connsiteX29" y="connsiteY29"/>
+              </a:cxn>
+              <a:cxn ang="0">
+                <a:pos x="connsiteX30" y="connsiteY30"/>
+              </a:cxn>
+              <a:cxn ang="0">
+                <a:pos x="connsiteX31" y="connsiteY31"/>
+              </a:cxn>
+              <a:cxn ang="0">
+                <a:pos x="connsiteX32" y="connsiteY32"/>
+              </a:cxn>
+              <a:cxn ang="0">
+                <a:pos x="connsiteX33" y="connsiteY33"/>
+              </a:cxn>
+              <a:cxn ang="0">
+                <a:pos x="connsiteX34" y="connsiteY34"/>
+              </a:cxn>
+              <a:cxn ang="0">
+                <a:pos x="connsiteX35" y="connsiteY35"/>
+              </a:cxn>
+              <a:cxn ang="0">
+                <a:pos x="connsiteX36" y="connsiteY36"/>
+              </a:cxn>
+              <a:cxn ang="0">
+                <a:pos x="connsiteX37" y="connsiteY37"/>
+              </a:cxn>
+              <a:cxn ang="0">
+                <a:pos x="connsiteX38" y="connsiteY38"/>
+              </a:cxn>
+              <a:cxn ang="0">
+                <a:pos x="connsiteX39" y="connsiteY39"/>
+              </a:cxn>
+              <a:cxn ang="0">
+                <a:pos x="connsiteX40" y="connsiteY40"/>
+              </a:cxn>
+              <a:cxn ang="0">
+                <a:pos x="connsiteX41" y="connsiteY41"/>
+              </a:cxn>
+              <a:cxn ang="0">
+                <a:pos x="connsiteX42" y="connsiteY42"/>
+              </a:cxn>
+              <a:cxn ang="0">
+                <a:pos x="connsiteX43" y="connsiteY43"/>
+              </a:cxn>
+              <a:cxn ang="0">
+                <a:pos x="connsiteX44" y="connsiteY44"/>
+              </a:cxn>
+              <a:cxn ang="0">
+                <a:pos x="connsiteX45" y="connsiteY45"/>
+              </a:cxn>
+              <a:cxn ang="0">
+                <a:pos x="connsiteX46" y="connsiteY46"/>
+              </a:cxn>
+              <a:cxn ang="0">
+                <a:pos x="connsiteX47" y="connsiteY47"/>
+              </a:cxn>
+              <a:cxn ang="0">
+                <a:pos x="connsiteX48" y="connsiteY48"/>
+              </a:cxn>
+              <a:cxn ang="0">
+                <a:pos x="connsiteX49" y="connsiteY49"/>
+              </a:cxn>
+              <a:cxn ang="0">
+                <a:pos x="connsiteX50" y="connsiteY50"/>
+              </a:cxn>
+              <a:cxn ang="0">
+                <a:pos x="connsiteX51" y="connsiteY51"/>
+              </a:cxn>
+              <a:cxn ang="0">
+                <a:pos x="connsiteX52" y="connsiteY52"/>
+              </a:cxn>
+              <a:cxn ang="0">
+                <a:pos x="connsiteX53" y="connsiteY53"/>
+              </a:cxn>
+            </a:cxnLst>
+            <a:rect l="l" t="t" r="r" b="b"/>
+            <a:pathLst>
+              <a:path w="6088489" h="6858002">
+                <a:moveTo>
+                  <a:pt x="0" y="0"/>
+                </a:moveTo>
+                <a:lnTo>
+                  <a:pt x="3563332" y="0"/>
+                </a:lnTo>
+                <a:lnTo>
+                  <a:pt x="3563332" y="3"/>
+                </a:lnTo>
+                <a:lnTo>
+                  <a:pt x="5842099" y="3"/>
+                </a:lnTo>
+                <a:lnTo>
+                  <a:pt x="5842099" y="4"/>
+                </a:lnTo>
+                <a:lnTo>
+                  <a:pt x="5835346" y="4"/>
+                </a:lnTo>
+                <a:lnTo>
+                  <a:pt x="5841229" y="40466"/>
+                </a:lnTo>
+                <a:lnTo>
+                  <a:pt x="5858543" y="159110"/>
+                </a:lnTo>
+                <a:lnTo>
+                  <a:pt x="5870645" y="245521"/>
+                </a:lnTo>
+                <a:lnTo>
+                  <a:pt x="5883420" y="348391"/>
+                </a:lnTo>
+                <a:lnTo>
+                  <a:pt x="5898716" y="470463"/>
+                </a:lnTo>
+                <a:lnTo>
+                  <a:pt x="5914853" y="605566"/>
+                </a:lnTo>
+                <a:lnTo>
+                  <a:pt x="5931830" y="757813"/>
+                </a:lnTo>
+                <a:lnTo>
+                  <a:pt x="5949815" y="923777"/>
+                </a:lnTo>
+                <a:lnTo>
+                  <a:pt x="5967801" y="1104142"/>
+                </a:lnTo>
+                <a:lnTo>
+                  <a:pt x="5986122" y="1296166"/>
+                </a:lnTo>
+                <a:lnTo>
+                  <a:pt x="6003099" y="1503278"/>
+                </a:lnTo>
+                <a:lnTo>
+                  <a:pt x="6019404" y="1719991"/>
+                </a:lnTo>
+                <a:lnTo>
+                  <a:pt x="6034196" y="1949048"/>
+                </a:lnTo>
+                <a:lnTo>
+                  <a:pt x="6048315" y="2187706"/>
+                </a:lnTo>
+                <a:lnTo>
+                  <a:pt x="6061595" y="2436652"/>
+                </a:lnTo>
+                <a:lnTo>
+                  <a:pt x="6066301" y="2564211"/>
+                </a:lnTo>
+                <a:lnTo>
+                  <a:pt x="6071512" y="2694512"/>
+                </a:lnTo>
+                <a:lnTo>
+                  <a:pt x="6076386" y="2826871"/>
+                </a:lnTo>
+                <a:lnTo>
+                  <a:pt x="6079580" y="2959917"/>
+                </a:lnTo>
+                <a:lnTo>
+                  <a:pt x="6082438" y="3095705"/>
+                </a:lnTo>
+                <a:lnTo>
+                  <a:pt x="6085463" y="3232865"/>
+                </a:lnTo>
+                <a:lnTo>
+                  <a:pt x="6087480" y="3372768"/>
+                </a:lnTo>
+                <a:lnTo>
+                  <a:pt x="6087480" y="3514043"/>
+                </a:lnTo>
+                <a:lnTo>
+                  <a:pt x="6088489" y="3656689"/>
+                </a:lnTo>
+                <a:lnTo>
+                  <a:pt x="6087480" y="3800707"/>
+                </a:lnTo>
+                <a:lnTo>
+                  <a:pt x="6085463" y="3946783"/>
+                </a:lnTo>
+                <a:lnTo>
+                  <a:pt x="6083614" y="4092858"/>
+                </a:lnTo>
+                <a:lnTo>
+                  <a:pt x="6079580" y="4240991"/>
+                </a:lnTo>
+                <a:lnTo>
+                  <a:pt x="6075378" y="4390495"/>
+                </a:lnTo>
+                <a:lnTo>
+                  <a:pt x="6070503" y="4540000"/>
+                </a:lnTo>
+                <a:lnTo>
+                  <a:pt x="6063612" y="4690876"/>
+                </a:lnTo>
+                <a:lnTo>
+                  <a:pt x="6055375" y="4843123"/>
+                </a:lnTo>
+                <a:lnTo>
+                  <a:pt x="6047475" y="4996057"/>
+                </a:lnTo>
+                <a:lnTo>
+                  <a:pt x="6037390" y="5148990"/>
+                </a:lnTo>
+                <a:lnTo>
+                  <a:pt x="6025287" y="5303981"/>
+                </a:lnTo>
+                <a:lnTo>
+                  <a:pt x="6013185" y="5456914"/>
+                </a:lnTo>
+                <a:lnTo>
+                  <a:pt x="5999233" y="5612591"/>
+                </a:lnTo>
+                <a:lnTo>
+                  <a:pt x="5983937" y="5768953"/>
+                </a:lnTo>
+                <a:lnTo>
+                  <a:pt x="5967801" y="5923258"/>
+                </a:lnTo>
+                <a:lnTo>
+                  <a:pt x="5948975" y="6079621"/>
+                </a:lnTo>
+                <a:lnTo>
+                  <a:pt x="5928804" y="6235297"/>
+                </a:lnTo>
+                <a:lnTo>
+                  <a:pt x="5908801" y="6391660"/>
+                </a:lnTo>
+                <a:lnTo>
+                  <a:pt x="5885437" y="6547336"/>
+                </a:lnTo>
+                <a:lnTo>
+                  <a:pt x="5861568" y="6702327"/>
+                </a:lnTo>
+                <a:lnTo>
+                  <a:pt x="5836524" y="6858002"/>
+                </a:lnTo>
+                <a:lnTo>
+                  <a:pt x="3563332" y="6858002"/>
+                </a:lnTo>
+                <a:lnTo>
+                  <a:pt x="1223490" y="6858002"/>
+                </a:lnTo>
+                <a:lnTo>
+                  <a:pt x="0" y="6858002"/>
+                </a:lnTo>
+                <a:close/>
+              </a:path>
+            </a:pathLst>
+          </a:custGeom>
+          <a:ln>
+            <a:noFill/>
+          </a:ln>
+          <a:effectLst>
+            <a:outerShdw blurRad="50800" dist="38100" dir="10800000" algn="r" rotWithShape="0">
+              <a:prstClr val="black">
+                <a:alpha val="40000"/>
+              </a:prstClr>
+            </a:outerShdw>
+          </a:effectLst>
+        </p:spPr>
+        <p:style>
+          <a:lnRef idx="2">
+            <a:schemeClr val="accent1">
+              <a:shade val="50000"/>
+            </a:schemeClr>
+          </a:lnRef>
+          <a:fillRef idx="1">
+            <a:schemeClr val="accent1"/>
+          </a:fillRef>
+          <a:effectRef idx="0">
+            <a:schemeClr val="accent1"/>
+          </a:effectRef>
+          <a:fontRef idx="minor">
+            <a:schemeClr val="lt1"/>
+          </a:fontRef>
+        </p:style>
+        <p:txBody>
+          <a:bodyPr rtlCol="0" anchor="ctr"/>
+          <a:lstStyle/>
+          <a:p>
+            <a:pPr algn="ctr"/>
+            <a:endParaRPr lang="en-US"/>
+          </a:p>
+        </p:txBody>
+      </p:sp>
+      <p:sp>
+        <p:nvSpPr>
+          <p:cNvPr id="2" name="Title 1">
+            <a:extLst>
+              <a:ext uri="{FF2B5EF4-FFF2-40B4-BE49-F238E27FC236}">
+                <a16:creationId xmlns:a16="http://schemas.microsoft.com/office/drawing/2014/main" id="{8A32CE53-9924-5792-2AB2-2EDF9F187EAA}"/>
+              </a:ext>
+            </a:extLst>
+          </p:cNvPr>
+          <p:cNvSpPr>
+            <a:spLocks noGrp="1"/>
+          </p:cNvSpPr>
+          <p:nvPr>
+            <p:ph type="title"/>
+          </p:nvPr>
+        </p:nvSpPr>
+        <p:spPr>
+          <a:xfrm>
+            <a:off x="4654295" y="965196"/>
+            <a:ext cx="6197686" cy="1371604"/>
+          </a:xfrm>
+        </p:spPr>
+        <p:txBody>
+          <a:bodyPr>
+            <a:normAutofit/>
+          </a:bodyPr>
+          <a:lstStyle/>
+          <a:p>
+            <a:pPr algn="l"/>
+            <a:r>
+              <a:rPr lang="en-PH" dirty="0"/>
+              <a:t>Program Structure</a:t>
+            </a:r>
+          </a:p>
+        </p:txBody>
+      </p:sp>
+      <p:pic>
+        <p:nvPicPr>
+          <p:cNvPr id="7" name="Graphic 6" descr="Hierarchy">
+            <a:extLst>
+              <a:ext uri="{FF2B5EF4-FFF2-40B4-BE49-F238E27FC236}">
+                <a16:creationId xmlns:a16="http://schemas.microsoft.com/office/drawing/2014/main" id="{CADC99EA-0C2E-2FC4-8B42-666C8B4582AA}"/>
+              </a:ext>
+            </a:extLst>
+          </p:cNvPr>
+          <p:cNvPicPr>
+            <a:picLocks noChangeAspect="1"/>
+          </p:cNvPicPr>
+          <p:nvPr/>
+        </p:nvPicPr>
+        <p:blipFill>
+          <a:blip r:embed="rId3">
+            <a:extLst>
+              <a:ext uri="{28A0092B-C50C-407E-A947-70E740481C1C}">
+                <a14:useLocalDpi xmlns:a14="http://schemas.microsoft.com/office/drawing/2010/main" val="0"/>
+              </a:ext>
+              <a:ext uri="{96DAC541-7B7A-43D3-8B79-37D633B846F1}">
+                <asvg:svgBlip xmlns:asvg="http://schemas.microsoft.com/office/drawing/2016/SVG/main" r:embed="rId4"/>
+              </a:ext>
+            </a:extLst>
+          </a:blip>
+          <a:stretch>
+            <a:fillRect/>
+          </a:stretch>
+        </p:blipFill>
+        <p:spPr>
+          <a:xfrm>
+            <a:off x="644332" y="2170143"/>
+            <a:ext cx="2517715" cy="2517715"/>
+          </a:xfrm>
+          <a:prstGeom prst="rect">
+            <a:avLst/>
+          </a:prstGeom>
+        </p:spPr>
+      </p:pic>
+      <p:sp>
+        <p:nvSpPr>
+          <p:cNvPr id="3" name="Content Placeholder 2">
+            <a:extLst>
+              <a:ext uri="{FF2B5EF4-FFF2-40B4-BE49-F238E27FC236}">
+                <a16:creationId xmlns:a16="http://schemas.microsoft.com/office/drawing/2014/main" id="{622530AC-62CF-ADA2-A55A-E0BF0303AD8E}"/>
+              </a:ext>
+            </a:extLst>
+          </p:cNvPr>
+          <p:cNvSpPr>
+            <a:spLocks noGrp="1"/>
+          </p:cNvSpPr>
+          <p:nvPr>
+            <p:ph idx="1"/>
+          </p:nvPr>
+        </p:nvSpPr>
+        <p:spPr>
+          <a:xfrm>
+            <a:off x="4654294" y="2336800"/>
+            <a:ext cx="6470905" cy="3740150"/>
+          </a:xfrm>
+        </p:spPr>
+        <p:txBody>
+          <a:bodyPr>
+            <a:normAutofit lnSpcReduction="10000"/>
+          </a:bodyPr>
+          <a:lstStyle/>
+          <a:p>
+            <a:pPr>
+              <a:lnSpc>
+                <a:spcPct val="90000"/>
+              </a:lnSpc>
+            </a:pPr>
+            <a:r>
+              <a:rPr lang="en-PH" sz="2000" dirty="0">
+                <a:effectLst/>
+              </a:rPr>
+              <a:t>COBOL has a hierarchical structure that comprises divisions, sections, paragraphs, sentences, verbs and character strings.</a:t>
+            </a:r>
+          </a:p>
+          <a:p>
+            <a:pPr>
+              <a:lnSpc>
+                <a:spcPct val="90000"/>
+              </a:lnSpc>
+            </a:pPr>
+            <a:r>
+              <a:rPr lang="en-US" sz="2000" dirty="0">
+                <a:effectLst/>
+              </a:rPr>
+              <a:t>The divisional nature of a COBOL system (which comprises four divisions) enables a distinct separation of concerns within COBOL programs</a:t>
+            </a:r>
+          </a:p>
+          <a:p>
+            <a:pPr>
+              <a:lnSpc>
+                <a:spcPct val="90000"/>
+              </a:lnSpc>
+            </a:pPr>
+            <a:r>
+              <a:rPr lang="en-US" sz="2000" dirty="0">
+                <a:effectLst/>
+              </a:rPr>
+              <a:t>COBOL divisions are as follows:</a:t>
+            </a:r>
+          </a:p>
+          <a:p>
+            <a:pPr lvl="1">
+              <a:lnSpc>
+                <a:spcPct val="90000"/>
+              </a:lnSpc>
+            </a:pPr>
+            <a:r>
+              <a:rPr lang="en-US" sz="2000" dirty="0">
+                <a:effectLst/>
+              </a:rPr>
+              <a:t>Identification division</a:t>
+            </a:r>
+          </a:p>
+          <a:p>
+            <a:pPr lvl="1">
+              <a:lnSpc>
+                <a:spcPct val="90000"/>
+              </a:lnSpc>
+            </a:pPr>
+            <a:r>
+              <a:rPr lang="en-US" sz="2000" dirty="0">
+                <a:effectLst/>
+              </a:rPr>
+              <a:t>Environment division</a:t>
+            </a:r>
+          </a:p>
+          <a:p>
+            <a:pPr lvl="1">
+              <a:lnSpc>
+                <a:spcPct val="90000"/>
+              </a:lnSpc>
+            </a:pPr>
+            <a:r>
+              <a:rPr lang="en-US" sz="2000" dirty="0">
+                <a:effectLst/>
+              </a:rPr>
+              <a:t>Data division</a:t>
+            </a:r>
+          </a:p>
+          <a:p>
+            <a:pPr lvl="1">
+              <a:lnSpc>
+                <a:spcPct val="90000"/>
+              </a:lnSpc>
+            </a:pPr>
+            <a:r>
+              <a:rPr lang="en-US" sz="2000" dirty="0">
+                <a:effectLst/>
+              </a:rPr>
+              <a:t>Procedure division</a:t>
+            </a:r>
+            <a:endParaRPr lang="en-PH" sz="2000" dirty="0"/>
+          </a:p>
+        </p:txBody>
+      </p:sp>
+    </p:spTree>
+    <p:extLst>
+      <p:ext uri="{BB962C8B-B14F-4D97-AF65-F5344CB8AC3E}">
+        <p14:creationId xmlns:p14="http://schemas.microsoft.com/office/powerpoint/2010/main" val="3036648655"/>
       </p:ext>
     </p:extLst>
   </p:cSld>
@@ -8291,15 +9551,6 @@
 </file>
 
 <file path=customXml/item2.xml><?xml version="1.0" encoding="utf-8"?>
-<p:properties xmlns:p="http://schemas.microsoft.com/office/2006/metadata/properties" xmlns:xsi="http://www.w3.org/2001/XMLSchema-instance" xmlns:pc="http://schemas.microsoft.com/office/infopath/2007/PartnerControls">
-  <documentManagement>
-    <Status xmlns="71af3243-3dd4-4a8d-8c0d-dd76da1f02a5">Not started</Status>
-    <MediaServiceKeyPoints xmlns="71af3243-3dd4-4a8d-8c0d-dd76da1f02a5" xsi:nil="true"/>
-  </documentManagement>
-</p:properties>
-</file>
-
-<file path=customXml/item3.xml><?xml version="1.0" encoding="utf-8"?>
 <ct:contentTypeSchema xmlns:ct="http://schemas.microsoft.com/office/2006/metadata/contentType" xmlns:ma="http://schemas.microsoft.com/office/2006/metadata/properties/metaAttributes" ct:_="" ma:_="" ma:contentTypeName="Document" ma:contentTypeID="0x01010079F111ED35F8CC479449609E8A0923A6" ma:contentTypeVersion="12" ma:contentTypeDescription="Create a new document." ma:contentTypeScope="" ma:versionID="a410dd7f93c95333ffa1b60ed6adedd1">
   <xsd:schema xmlns:xsd="http://www.w3.org/2001/XMLSchema" xmlns:xs="http://www.w3.org/2001/XMLSchema" xmlns:p="http://schemas.microsoft.com/office/2006/metadata/properties" xmlns:ns2="71af3243-3dd4-4a8d-8c0d-dd76da1f02a5" xmlns:ns3="16c05727-aa75-4e4a-9b5f-8a80a1165891" targetNamespace="http://schemas.microsoft.com/office/2006/metadata/properties" ma:root="true" ma:fieldsID="a936d9baba76aa3866493feff160faab" ns2:_="" ns3:_="">
     <xsd:import namespace="71af3243-3dd4-4a8d-8c0d-dd76da1f02a5"/>
@@ -8520,6 +9771,15 @@
 </ct:contentTypeSchema>
 </file>
 
+<file path=customXml/item3.xml><?xml version="1.0" encoding="utf-8"?>
+<p:properties xmlns:p="http://schemas.microsoft.com/office/2006/metadata/properties" xmlns:xsi="http://www.w3.org/2001/XMLSchema-instance" xmlns:pc="http://schemas.microsoft.com/office/infopath/2007/PartnerControls">
+  <documentManagement>
+    <Status xmlns="71af3243-3dd4-4a8d-8c0d-dd76da1f02a5">Not started</Status>
+    <MediaServiceKeyPoints xmlns="71af3243-3dd4-4a8d-8c0d-dd76da1f02a5" xsi:nil="true"/>
+  </documentManagement>
+</p:properties>
+</file>
+
 <file path=customXml/itemProps1.xml><?xml version="1.0" encoding="utf-8"?>
 <ds:datastoreItem xmlns:ds="http://schemas.openxmlformats.org/officeDocument/2006/customXml" ds:itemID="{64B270AB-C138-415C-897E-3C24487DECF1}">
   <ds:schemaRefs>
@@ -8529,16 +9789,6 @@
 </file>
 
 <file path=customXml/itemProps2.xml><?xml version="1.0" encoding="utf-8"?>
-<ds:datastoreItem xmlns:ds="http://schemas.openxmlformats.org/officeDocument/2006/customXml" ds:itemID="{2C4C00F4-06E9-43E3-AD97-88A857CEFA82}">
-  <ds:schemaRefs>
-    <ds:schemaRef ds:uri="http://schemas.microsoft.com/office/2006/metadata/properties"/>
-    <ds:schemaRef ds:uri="http://schemas.microsoft.com/office/infopath/2007/PartnerControls"/>
-    <ds:schemaRef ds:uri="71af3243-3dd4-4a8d-8c0d-dd76da1f02a5"/>
-  </ds:schemaRefs>
-</ds:datastoreItem>
-</file>
-
-<file path=customXml/itemProps3.xml><?xml version="1.0" encoding="utf-8"?>
 <ds:datastoreItem xmlns:ds="http://schemas.openxmlformats.org/officeDocument/2006/customXml" ds:itemID="{0585E981-8C91-4205-A0C3-C991F42B4C9E}">
   <ds:schemaRefs>
     <ds:schemaRef ds:uri="http://schemas.microsoft.com/office/2006/metadata/contentType"/>
@@ -8555,4 +9805,14 @@
     <ds:schemaRef ds:uri="http://schemas.microsoft.com/internal/obd"/>
   </ds:schemaRefs>
 </ds:datastoreItem>
+</file>
+
+<file path=customXml/itemProps3.xml><?xml version="1.0" encoding="utf-8"?>
+<ds:datastoreItem xmlns:ds="http://schemas.openxmlformats.org/officeDocument/2006/customXml" ds:itemID="{2C4C00F4-06E9-43E3-AD97-88A857CEFA82}">
+  <ds:schemaRefs>
+    <ds:schemaRef ds:uri="http://schemas.microsoft.com/office/2006/metadata/properties"/>
+    <ds:schemaRef ds:uri="http://schemas.microsoft.com/office/infopath/2007/PartnerControls"/>
+    <ds:schemaRef ds:uri="71af3243-3dd4-4a8d-8c0d-dd76da1f02a5"/>
+  </ds:schemaRefs>
+</ds:datastoreItem>
 </file>
</xml_diff>

<commit_message>
added identification division to pptx
</commit_message>
<xml_diff>
--- a/cobol/cobol.pptx
+++ b/cobol/cobol.pptx
@@ -5,7 +5,7 @@
     <p:sldMasterId id="2147483660" r:id="rId4"/>
   </p:sldMasterIdLst>
   <p:notesMasterIdLst>
-    <p:notesMasterId r:id="rId13"/>
+    <p:notesMasterId r:id="rId14"/>
   </p:notesMasterIdLst>
   <p:sldIdLst>
     <p:sldId id="278" r:id="rId5"/>
@@ -16,6 +16,7 @@
     <p:sldId id="282" r:id="rId10"/>
     <p:sldId id="283" r:id="rId11"/>
     <p:sldId id="285" r:id="rId12"/>
+    <p:sldId id="286" r:id="rId13"/>
   </p:sldIdLst>
   <p:sldSz cx="12192000" cy="6858000"/>
   <p:notesSz cx="6858000" cy="9144000"/>
@@ -135,6 +136,7 @@
           <p14:sldIdLst>
             <p14:sldId id="283"/>
             <p14:sldId id="285"/>
+            <p14:sldId id="286"/>
           </p14:sldIdLst>
         </p14:section>
       </p14:sectionLst>
@@ -6508,7 +6510,7 @@
           </a:effectLst>
           <a:extLst>
             <a:ext uri="{91240B29-F687-4f45-9708-019B960494DF}">
-              <a14:hiddenLine xmlns="" xmlns:a14="http://schemas.microsoft.com/office/drawing/2010/main" xmlns:p14="http://schemas.microsoft.com/office/powerpoint/2010/main" xmlns:a16="http://schemas.microsoft.com/office/drawing/2014/main" w="9525">
+              <a14:hiddenLine xmlns:a16="http://schemas.microsoft.com/office/drawing/2014/main" xmlns:p14="http://schemas.microsoft.com/office/powerpoint/2010/main" xmlns:a14="http://schemas.microsoft.com/office/drawing/2010/main" xmlns="" w="9525">
                 <a:solidFill>
                   <a:srgbClr val="000000"/>
                 </a:solidFill>
@@ -8969,6 +8971,257 @@
     <p:extLst>
       <p:ext uri="{BB962C8B-B14F-4D97-AF65-F5344CB8AC3E}">
         <p14:creationId xmlns:p14="http://schemas.microsoft.com/office/powerpoint/2010/main" val="3036648655"/>
+      </p:ext>
+    </p:extLst>
+  </p:cSld>
+  <p:clrMapOvr>
+    <a:masterClrMapping/>
+  </p:clrMapOvr>
+</p:sld>
+</file>
+
+<file path=ppt/slides/slide9.xml><?xml version="1.0" encoding="utf-8"?>
+<p:sld xmlns:a="http://schemas.openxmlformats.org/drawingml/2006/main" xmlns:r="http://schemas.openxmlformats.org/officeDocument/2006/relationships" xmlns:p="http://schemas.openxmlformats.org/presentationml/2006/main">
+  <p:cSld>
+    <p:bg>
+      <p:bgPr>
+        <a:blipFill rotWithShape="1">
+          <a:blip r:embed="rId2">
+            <a:duotone>
+              <a:schemeClr val="bg1">
+                <a:shade val="80000"/>
+                <a:lumMod val="80000"/>
+              </a:schemeClr>
+              <a:schemeClr val="bg1">
+                <a:tint val="98000"/>
+              </a:schemeClr>
+            </a:duotone>
+          </a:blip>
+          <a:stretch/>
+        </a:blipFill>
+        <a:effectLst/>
+      </p:bgPr>
+    </p:bg>
+    <p:spTree>
+      <p:nvGrpSpPr>
+        <p:cNvPr id="1" name=""/>
+        <p:cNvGrpSpPr/>
+        <p:nvPr/>
+      </p:nvGrpSpPr>
+      <p:grpSpPr>
+        <a:xfrm>
+          <a:off x="0" y="0"/>
+          <a:ext cx="0" cy="0"/>
+          <a:chOff x="0" y="0"/>
+          <a:chExt cx="0" cy="0"/>
+        </a:xfrm>
+      </p:grpSpPr>
+      <p:sp useBgFill="1">
+        <p:nvSpPr>
+          <p:cNvPr id="8" name="Rectangle 7">
+            <a:extLst>
+              <a:ext uri="{FF2B5EF4-FFF2-40B4-BE49-F238E27FC236}">
+                <a16:creationId xmlns:a16="http://schemas.microsoft.com/office/drawing/2014/main" id="{9A6C2C86-63BF-47D5-AA3F-905111A238E2}"/>
+              </a:ext>
+              <a:ext uri="{C183D7F6-B498-43B3-948B-1728B52AA6E4}">
+                <adec:decorative xmlns:adec="http://schemas.microsoft.com/office/drawing/2017/decorative" val="1"/>
+              </a:ext>
+            </a:extLst>
+          </p:cNvPr>
+          <p:cNvSpPr>
+            <a:spLocks noGrp="1" noRot="1" noChangeAspect="1" noMove="1" noResize="1" noEditPoints="1" noAdjustHandles="1" noChangeArrowheads="1" noChangeShapeType="1" noTextEdit="1"/>
+          </p:cNvSpPr>
+          <p:nvPr>
+            <p:extLst>
+              <p:ext uri="{386F3935-93C4-4BCD-93E2-E3B085C9AB24}">
+                <p16:designElem xmlns:p16="http://schemas.microsoft.com/office/powerpoint/2015/main" val="1"/>
+              </p:ext>
+            </p:extLst>
+          </p:nvPr>
+        </p:nvSpPr>
+        <p:spPr>
+          <a:xfrm>
+            <a:off x="0" y="0"/>
+            <a:ext cx="12192000" cy="6858000"/>
+          </a:xfrm>
+          <a:prstGeom prst="rect">
+            <a:avLst/>
+          </a:prstGeom>
+          <a:ln>
+            <a:noFill/>
+          </a:ln>
+        </p:spPr>
+        <p:style>
+          <a:lnRef idx="2">
+            <a:schemeClr val="accent1">
+              <a:shade val="50000"/>
+            </a:schemeClr>
+          </a:lnRef>
+          <a:fillRef idx="1">
+            <a:schemeClr val="accent1"/>
+          </a:fillRef>
+          <a:effectRef idx="0">
+            <a:schemeClr val="accent1"/>
+          </a:effectRef>
+          <a:fontRef idx="minor">
+            <a:schemeClr val="lt1"/>
+          </a:fontRef>
+        </p:style>
+        <p:txBody>
+          <a:bodyPr rtlCol="0" anchor="ctr"/>
+          <a:lstStyle/>
+          <a:p>
+            <a:pPr algn="ctr"/>
+            <a:endParaRPr lang="en-US"/>
+          </a:p>
+        </p:txBody>
+      </p:sp>
+      <p:sp>
+        <p:nvSpPr>
+          <p:cNvPr id="2" name="Title 1">
+            <a:extLst>
+              <a:ext uri="{FF2B5EF4-FFF2-40B4-BE49-F238E27FC236}">
+                <a16:creationId xmlns:a16="http://schemas.microsoft.com/office/drawing/2014/main" id="{D4FCE7B5-8275-BC21-A922-FCB459D15932}"/>
+              </a:ext>
+            </a:extLst>
+          </p:cNvPr>
+          <p:cNvSpPr>
+            <a:spLocks noGrp="1"/>
+          </p:cNvSpPr>
+          <p:nvPr>
+            <p:ph type="title"/>
+          </p:nvPr>
+        </p:nvSpPr>
+        <p:spPr>
+          <a:xfrm>
+            <a:off x="834013" y="1115568"/>
+            <a:ext cx="3487616" cy="4626864"/>
+          </a:xfrm>
+        </p:spPr>
+        <p:txBody>
+          <a:bodyPr>
+            <a:normAutofit/>
+          </a:bodyPr>
+          <a:lstStyle/>
+          <a:p>
+            <a:pPr algn="l"/>
+            <a:r>
+              <a:rPr lang="en-PH" sz="3600" dirty="0"/>
+              <a:t>Identification Division</a:t>
+            </a:r>
+          </a:p>
+        </p:txBody>
+      </p:sp>
+      <p:cxnSp>
+        <p:nvCxnSpPr>
+          <p:cNvPr id="10" name="Straight Connector 9">
+            <a:extLst>
+              <a:ext uri="{FF2B5EF4-FFF2-40B4-BE49-F238E27FC236}">
+                <a16:creationId xmlns:a16="http://schemas.microsoft.com/office/drawing/2014/main" id="{425A0768-3044-4AA9-A889-D2CAA68C517A}"/>
+              </a:ext>
+              <a:ext uri="{C183D7F6-B498-43B3-948B-1728B52AA6E4}">
+                <adec:decorative xmlns:adec="http://schemas.microsoft.com/office/drawing/2017/decorative" val="1"/>
+              </a:ext>
+            </a:extLst>
+          </p:cNvPr>
+          <p:cNvCxnSpPr>
+            <a:cxnSpLocks noGrp="1" noRot="1" noChangeAspect="1" noMove="1" noResize="1" noEditPoints="1" noAdjustHandles="1" noChangeArrowheads="1" noChangeShapeType="1"/>
+          </p:cNvCxnSpPr>
+          <p:nvPr>
+            <p:extLst>
+              <p:ext uri="{386F3935-93C4-4BCD-93E2-E3B085C9AB24}">
+                <p16:designElem xmlns:p16="http://schemas.microsoft.com/office/powerpoint/2015/main" val="1"/>
+              </p:ext>
+            </p:extLst>
+          </p:nvPr>
+        </p:nvCxnSpPr>
+        <p:spPr>
+          <a:xfrm>
+            <a:off x="4654605" y="2057400"/>
+            <a:ext cx="0" cy="2743200"/>
+          </a:xfrm>
+          <a:prstGeom prst="line">
+            <a:avLst/>
+          </a:prstGeom>
+          <a:ln w="19050">
+            <a:solidFill>
+              <a:schemeClr val="tx2"/>
+            </a:solidFill>
+          </a:ln>
+        </p:spPr>
+        <p:style>
+          <a:lnRef idx="1">
+            <a:schemeClr val="accent1"/>
+          </a:lnRef>
+          <a:fillRef idx="0">
+            <a:schemeClr val="accent1"/>
+          </a:fillRef>
+          <a:effectRef idx="0">
+            <a:schemeClr val="accent1"/>
+          </a:effectRef>
+          <a:fontRef idx="minor">
+            <a:schemeClr val="tx1"/>
+          </a:fontRef>
+        </p:style>
+      </p:cxnSp>
+      <p:sp>
+        <p:nvSpPr>
+          <p:cNvPr id="3" name="Content Placeholder 2">
+            <a:extLst>
+              <a:ext uri="{FF2B5EF4-FFF2-40B4-BE49-F238E27FC236}">
+                <a16:creationId xmlns:a16="http://schemas.microsoft.com/office/drawing/2014/main" id="{6EA792A7-BF81-A2CD-955E-77DD69D52169}"/>
+              </a:ext>
+            </a:extLst>
+          </p:cNvPr>
+          <p:cNvSpPr>
+            <a:spLocks noGrp="1"/>
+          </p:cNvSpPr>
+          <p:nvPr>
+            <p:ph idx="1"/>
+          </p:nvPr>
+        </p:nvSpPr>
+        <p:spPr>
+          <a:xfrm>
+            <a:off x="5105398" y="1115568"/>
+            <a:ext cx="6245352" cy="4626864"/>
+          </a:xfrm>
+        </p:spPr>
+        <p:txBody>
+          <a:bodyPr anchor="ctr">
+            <a:normAutofit/>
+          </a:bodyPr>
+          <a:lstStyle/>
+          <a:p>
+            <a:r>
+              <a:rPr lang="en-US" dirty="0">
+                <a:effectLst/>
+              </a:rPr>
+              <a:t>is the first division of a COBOL program, and is mandatory</a:t>
+            </a:r>
+          </a:p>
+          <a:p>
+            <a:r>
+              <a:rPr lang="en-US" dirty="0">
+                <a:effectLst/>
+              </a:rPr>
+              <a:t>assigns the program a name and provides other identification information like author, date written and a brief description of the program's purpose</a:t>
+            </a:r>
+          </a:p>
+          <a:p>
+            <a:r>
+              <a:rPr lang="en-US" dirty="0">
+                <a:effectLst/>
+              </a:rPr>
+              <a:t>COBOL programs need a PROGRAM-ID paragraph to function within the identification division</a:t>
+            </a:r>
+            <a:endParaRPr lang="en-PH" dirty="0"/>
+          </a:p>
+        </p:txBody>
+      </p:sp>
+    </p:spTree>
+    <p:extLst>
+      <p:ext uri="{BB962C8B-B14F-4D97-AF65-F5344CB8AC3E}">
+        <p14:creationId xmlns:p14="http://schemas.microsoft.com/office/powerpoint/2010/main" val="609076788"/>
       </p:ext>
     </p:extLst>
   </p:cSld>
@@ -9542,15 +9795,6 @@
 </file>
 
 <file path=customXml/item1.xml><?xml version="1.0" encoding="utf-8"?>
-<?mso-contentType ?>
-<FormTemplates xmlns="http://schemas.microsoft.com/sharepoint/v3/contenttype/forms">
-  <Display>DocumentLibraryForm</Display>
-  <Edit>DocumentLibraryForm</Edit>
-  <New>DocumentLibraryForm</New>
-</FormTemplates>
-</file>
-
-<file path=customXml/item2.xml><?xml version="1.0" encoding="utf-8"?>
 <ct:contentTypeSchema xmlns:ct="http://schemas.microsoft.com/office/2006/metadata/contentType" xmlns:ma="http://schemas.microsoft.com/office/2006/metadata/properties/metaAttributes" ct:_="" ma:_="" ma:contentTypeName="Document" ma:contentTypeID="0x01010079F111ED35F8CC479449609E8A0923A6" ma:contentTypeVersion="12" ma:contentTypeDescription="Create a new document." ma:contentTypeScope="" ma:versionID="a410dd7f93c95333ffa1b60ed6adedd1">
   <xsd:schema xmlns:xsd="http://www.w3.org/2001/XMLSchema" xmlns:xs="http://www.w3.org/2001/XMLSchema" xmlns:p="http://schemas.microsoft.com/office/2006/metadata/properties" xmlns:ns2="71af3243-3dd4-4a8d-8c0d-dd76da1f02a5" xmlns:ns3="16c05727-aa75-4e4a-9b5f-8a80a1165891" targetNamespace="http://schemas.microsoft.com/office/2006/metadata/properties" ma:root="true" ma:fieldsID="a936d9baba76aa3866493feff160faab" ns2:_="" ns3:_="">
     <xsd:import namespace="71af3243-3dd4-4a8d-8c0d-dd76da1f02a5"/>
@@ -9771,6 +10015,15 @@
 </ct:contentTypeSchema>
 </file>
 
+<file path=customXml/item2.xml><?xml version="1.0" encoding="utf-8"?>
+<?mso-contentType ?>
+<FormTemplates xmlns="http://schemas.microsoft.com/sharepoint/v3/contenttype/forms">
+  <Display>DocumentLibraryForm</Display>
+  <Edit>DocumentLibraryForm</Edit>
+  <New>DocumentLibraryForm</New>
+</FormTemplates>
+</file>
+
 <file path=customXml/item3.xml><?xml version="1.0" encoding="utf-8"?>
 <p:properties xmlns:p="http://schemas.microsoft.com/office/2006/metadata/properties" xmlns:xsi="http://www.w3.org/2001/XMLSchema-instance" xmlns:pc="http://schemas.microsoft.com/office/infopath/2007/PartnerControls">
   <documentManagement>
@@ -9781,14 +10034,6 @@
 </file>
 
 <file path=customXml/itemProps1.xml><?xml version="1.0" encoding="utf-8"?>
-<ds:datastoreItem xmlns:ds="http://schemas.openxmlformats.org/officeDocument/2006/customXml" ds:itemID="{64B270AB-C138-415C-897E-3C24487DECF1}">
-  <ds:schemaRefs>
-    <ds:schemaRef ds:uri="http://schemas.microsoft.com/sharepoint/v3/contenttype/forms"/>
-  </ds:schemaRefs>
-</ds:datastoreItem>
-</file>
-
-<file path=customXml/itemProps2.xml><?xml version="1.0" encoding="utf-8"?>
 <ds:datastoreItem xmlns:ds="http://schemas.openxmlformats.org/officeDocument/2006/customXml" ds:itemID="{0585E981-8C91-4205-A0C3-C991F42B4C9E}">
   <ds:schemaRefs>
     <ds:schemaRef ds:uri="http://schemas.microsoft.com/office/2006/metadata/contentType"/>
@@ -9807,6 +10052,14 @@
 </ds:datastoreItem>
 </file>
 
+<file path=customXml/itemProps2.xml><?xml version="1.0" encoding="utf-8"?>
+<ds:datastoreItem xmlns:ds="http://schemas.openxmlformats.org/officeDocument/2006/customXml" ds:itemID="{64B270AB-C138-415C-897E-3C24487DECF1}">
+  <ds:schemaRefs>
+    <ds:schemaRef ds:uri="http://schemas.microsoft.com/sharepoint/v3/contenttype/forms"/>
+  </ds:schemaRefs>
+</ds:datastoreItem>
+</file>
+
 <file path=customXml/itemProps3.xml><?xml version="1.0" encoding="utf-8"?>
 <ds:datastoreItem xmlns:ds="http://schemas.openxmlformats.org/officeDocument/2006/customXml" ds:itemID="{2C4C00F4-06E9-43E3-AD97-88A857CEFA82}">
   <ds:schemaRefs>

</xml_diff>

<commit_message>
added program structure and variable declaration sections
</commit_message>
<xml_diff>
--- a/cobol/cobol.pptx
+++ b/cobol/cobol.pptx
@@ -5,7 +5,7 @@
     <p:sldMasterId id="2147483660" r:id="rId4"/>
   </p:sldMasterIdLst>
   <p:notesMasterIdLst>
-    <p:notesMasterId r:id="rId14"/>
+    <p:notesMasterId r:id="rId19"/>
   </p:notesMasterIdLst>
   <p:sldIdLst>
     <p:sldId id="278" r:id="rId5"/>
@@ -17,6 +17,11 @@
     <p:sldId id="283" r:id="rId11"/>
     <p:sldId id="285" r:id="rId12"/>
     <p:sldId id="286" r:id="rId13"/>
+    <p:sldId id="287" r:id="rId14"/>
+    <p:sldId id="289" r:id="rId15"/>
+    <p:sldId id="290" r:id="rId16"/>
+    <p:sldId id="291" r:id="rId17"/>
+    <p:sldId id="292" r:id="rId18"/>
   </p:sldIdLst>
   <p:sldSz cx="12192000" cy="6858000"/>
   <p:notesSz cx="6858000" cy="9144000"/>
@@ -137,6 +142,15 @@
             <p14:sldId id="283"/>
             <p14:sldId id="285"/>
             <p14:sldId id="286"/>
+            <p14:sldId id="287"/>
+            <p14:sldId id="289"/>
+            <p14:sldId id="290"/>
+            <p14:sldId id="291"/>
+          </p14:sldIdLst>
+        </p14:section>
+        <p14:section name="Syntax Section" id="{7135EA50-8AD3-4853-AB3F-50E914C89B00}">
+          <p14:sldIdLst>
+            <p14:sldId id="292"/>
           </p14:sldIdLst>
         </p14:section>
       </p14:sectionLst>
@@ -230,7 +244,7 @@
           <a:p>
             <a:fld id="{AFD01546-198A-4195-BCF8-F0FF54C90E5E}" type="datetimeFigureOut">
               <a:rPr lang="en-US" smtClean="0"/>
-              <a:t>12/1/2025</a:t>
+              <a:t>12/3/2025</a:t>
             </a:fld>
             <a:endParaRPr lang="en-US" dirty="0"/>
           </a:p>
@@ -826,7 +840,7 @@
           <a:p>
             <a:fld id="{88D38747-4367-4BD2-8D51-C97E202738E2}" type="datetime1">
               <a:rPr lang="en-US" smtClean="0"/>
-              <a:t>12/1/2025</a:t>
+              <a:t>12/3/2025</a:t>
             </a:fld>
             <a:endParaRPr lang="en-US" dirty="0"/>
           </a:p>
@@ -1131,7 +1145,7 @@
           <a:p>
             <a:fld id="{11F1B079-7EF0-44EE-B798-BCC497C9F3B2}" type="datetime1">
               <a:rPr lang="en-US" smtClean="0"/>
-              <a:t>12/1/2025</a:t>
+              <a:t>12/3/2025</a:t>
             </a:fld>
             <a:endParaRPr lang="en-US" dirty="0"/>
           </a:p>
@@ -1325,7 +1339,7 @@
           <a:p>
             <a:fld id="{28FF70A8-1D13-4657-95F0-A9EA54967B8D}" type="datetime1">
               <a:rPr lang="en-US" smtClean="0"/>
-              <a:t>12/1/2025</a:t>
+              <a:t>12/3/2025</a:t>
             </a:fld>
             <a:endParaRPr lang="en-US" dirty="0"/>
           </a:p>
@@ -1588,7 +1602,7 @@
           <a:p>
             <a:fld id="{21EB90AC-71BD-4C7F-8ACA-7B3F18292E63}" type="datetime1">
               <a:rPr lang="en-US" smtClean="0"/>
-              <a:t>12/1/2025</a:t>
+              <a:t>12/3/2025</a:t>
             </a:fld>
             <a:endParaRPr lang="en-US" dirty="0"/>
           </a:p>
@@ -2024,7 +2038,7 @@
           <a:p>
             <a:fld id="{4E6EFC2C-8905-46F0-B443-CE905B76BA01}" type="datetime1">
               <a:rPr lang="en-US" smtClean="0"/>
-              <a:t>12/1/2025</a:t>
+              <a:t>12/3/2025</a:t>
             </a:fld>
             <a:endParaRPr lang="en-US" dirty="0"/>
           </a:p>
@@ -2561,7 +2575,7 @@
           <a:p>
             <a:fld id="{D9079DC3-C9B5-499E-9140-0DC28B7074E2}" type="datetime1">
               <a:rPr lang="en-US" smtClean="0"/>
-              <a:t>12/1/2025</a:t>
+              <a:t>12/3/2025</a:t>
             </a:fld>
             <a:endParaRPr lang="en-US" dirty="0"/>
           </a:p>
@@ -3443,7 +3457,7 @@
           <a:p>
             <a:fld id="{30BB33EA-E472-4D22-9C03-A9C14AA21CED}" type="datetime1">
               <a:rPr lang="en-US" smtClean="0"/>
-              <a:t>12/1/2025</a:t>
+              <a:t>12/3/2025</a:t>
             </a:fld>
             <a:endParaRPr lang="en-US" dirty="0"/>
           </a:p>
@@ -3613,7 +3627,7 @@
           <a:p>
             <a:fld id="{73C55A3C-5767-4844-A0A3-83778C2E5409}" type="datetime1">
               <a:rPr lang="en-US" smtClean="0"/>
-              <a:t>12/1/2025</a:t>
+              <a:t>12/3/2025</a:t>
             </a:fld>
             <a:endParaRPr lang="en-US" dirty="0"/>
           </a:p>
@@ -3857,7 +3871,7 @@
           <a:p>
             <a:fld id="{CAE507A8-A5CF-4D38-AB86-7EDDA87A85D4}" type="datetime1">
               <a:rPr lang="en-US" smtClean="0"/>
-              <a:t>12/1/2025</a:t>
+              <a:t>12/3/2025</a:t>
             </a:fld>
             <a:endParaRPr lang="en-US" dirty="0"/>
           </a:p>
@@ -4099,7 +4113,7 @@
           <a:p>
             <a:fld id="{BDFCD27C-8599-43EF-BA1D-14DDC1946E06}" type="datetime1">
               <a:rPr lang="en-US" smtClean="0"/>
-              <a:t>12/1/2025</a:t>
+              <a:t>12/3/2025</a:t>
             </a:fld>
             <a:endParaRPr lang="en-US" dirty="0"/>
           </a:p>
@@ -4582,7 +4596,7 @@
           <a:p>
             <a:fld id="{49343D99-809A-49C0-96E5-4250D0B498EE}" type="datetime1">
               <a:rPr lang="en-US" smtClean="0"/>
-              <a:t>12/1/2025</a:t>
+              <a:t>12/3/2025</a:t>
             </a:fld>
             <a:endParaRPr lang="en-US" dirty="0"/>
           </a:p>
@@ -4700,7 +4714,7 @@
           <a:p>
             <a:fld id="{A143DE9B-B678-4EFB-BB7D-A4370204A0B0}" type="datetime1">
               <a:rPr lang="en-US" smtClean="0"/>
-              <a:t>12/1/2025</a:t>
+              <a:t>12/3/2025</a:t>
             </a:fld>
             <a:endParaRPr lang="en-US" dirty="0"/>
           </a:p>
@@ -4795,7 +4809,7 @@
           <a:p>
             <a:fld id="{E68812DA-F765-4142-A6A3-A8ED7235E082}" type="datetime1">
               <a:rPr lang="en-US" smtClean="0"/>
-              <a:t>12/1/2025</a:t>
+              <a:t>12/3/2025</a:t>
             </a:fld>
             <a:endParaRPr lang="en-US" dirty="0"/>
           </a:p>
@@ -5050,7 +5064,7 @@
           <a:p>
             <a:fld id="{3E0277FD-7DE6-41D4-930D-AC99F5AFE54E}" type="datetime1">
               <a:rPr lang="en-US" smtClean="0"/>
-              <a:t>12/1/2025</a:t>
+              <a:t>12/3/2025</a:t>
             </a:fld>
             <a:endParaRPr lang="en-US" dirty="0"/>
           </a:p>
@@ -5357,7 +5371,7 @@
           <a:p>
             <a:fld id="{9EA15526-7079-4B7B-987C-1B5FAE11A0FF}" type="datetime1">
               <a:rPr lang="en-US" smtClean="0"/>
-              <a:t>12/1/2025</a:t>
+              <a:t>12/3/2025</a:t>
             </a:fld>
             <a:endParaRPr lang="en-US" dirty="0"/>
           </a:p>
@@ -5592,7 +5606,7 @@
           <a:p>
             <a:fld id="{073ED0CC-082F-4160-86E5-0D6041F12778}" type="datetime1">
               <a:rPr lang="en-US" smtClean="0"/>
-              <a:t>12/1/2025</a:t>
+              <a:t>12/3/2025</a:t>
             </a:fld>
             <a:endParaRPr lang="en-US" dirty="0"/>
           </a:p>
@@ -6593,14 +6607,20 @@
           <a:p>
             <a:pPr algn="l"/>
             <a:r>
-              <a:rPr lang="en-US" sz="4000" dirty="0"/>
+              <a:rPr lang="en-US" sz="4000" dirty="0">
+                <a:latin typeface="Consolas" panose="020B0609020204030204" pitchFamily="49" charset="0"/>
+              </a:rPr>
               <a:t>COBOL: </a:t>
             </a:r>
             <a:br>
-              <a:rPr lang="en-US" sz="4000" dirty="0"/>
+              <a:rPr lang="en-US" sz="4000" dirty="0">
+                <a:latin typeface="Consolas" panose="020B0609020204030204" pitchFamily="49" charset="0"/>
+              </a:rPr>
             </a:br>
             <a:r>
-              <a:rPr lang="en-US" sz="4000" dirty="0"/>
+              <a:rPr lang="en-US" sz="4000" dirty="0">
+                <a:latin typeface="Consolas" panose="020B0609020204030204" pitchFamily="49" charset="0"/>
+              </a:rPr>
               <a:t>An Overview</a:t>
             </a:r>
           </a:p>
@@ -6610,6 +6630,1404 @@
     <p:extLst>
       <p:ext uri="{BB962C8B-B14F-4D97-AF65-F5344CB8AC3E}">
         <p14:creationId xmlns:p14="http://schemas.microsoft.com/office/powerpoint/2010/main" val="4167884232"/>
+      </p:ext>
+    </p:extLst>
+  </p:cSld>
+  <p:clrMapOvr>
+    <a:masterClrMapping/>
+  </p:clrMapOvr>
+</p:sld>
+</file>
+
+<file path=ppt/slides/slide10.xml><?xml version="1.0" encoding="utf-8"?>
+<p:sld xmlns:a="http://schemas.openxmlformats.org/drawingml/2006/main" xmlns:r="http://schemas.openxmlformats.org/officeDocument/2006/relationships" xmlns:p="http://schemas.openxmlformats.org/presentationml/2006/main">
+  <p:cSld>
+    <p:bg>
+      <p:bgPr>
+        <a:blipFill rotWithShape="1">
+          <a:blip r:embed="rId2">
+            <a:duotone>
+              <a:schemeClr val="bg1">
+                <a:shade val="80000"/>
+                <a:lumMod val="80000"/>
+              </a:schemeClr>
+              <a:schemeClr val="bg1">
+                <a:tint val="98000"/>
+              </a:schemeClr>
+            </a:duotone>
+          </a:blip>
+          <a:stretch/>
+        </a:blipFill>
+        <a:effectLst/>
+      </p:bgPr>
+    </p:bg>
+    <p:spTree>
+      <p:nvGrpSpPr>
+        <p:cNvPr id="1" name=""/>
+        <p:cNvGrpSpPr/>
+        <p:nvPr/>
+      </p:nvGrpSpPr>
+      <p:grpSpPr>
+        <a:xfrm>
+          <a:off x="0" y="0"/>
+          <a:ext cx="0" cy="0"/>
+          <a:chOff x="0" y="0"/>
+          <a:chExt cx="0" cy="0"/>
+        </a:xfrm>
+      </p:grpSpPr>
+      <p:sp useBgFill="1">
+        <p:nvSpPr>
+          <p:cNvPr id="8" name="Rectangle 7">
+            <a:extLst>
+              <a:ext uri="{FF2B5EF4-FFF2-40B4-BE49-F238E27FC236}">
+                <a16:creationId xmlns:a16="http://schemas.microsoft.com/office/drawing/2014/main" id="{9A6C2C86-63BF-47D5-AA3F-905111A238E2}"/>
+              </a:ext>
+              <a:ext uri="{C183D7F6-B498-43B3-948B-1728B52AA6E4}">
+                <adec:decorative xmlns:adec="http://schemas.microsoft.com/office/drawing/2017/decorative" val="1"/>
+              </a:ext>
+            </a:extLst>
+          </p:cNvPr>
+          <p:cNvSpPr>
+            <a:spLocks noGrp="1" noRot="1" noChangeAspect="1" noMove="1" noResize="1" noEditPoints="1" noAdjustHandles="1" noChangeArrowheads="1" noChangeShapeType="1" noTextEdit="1"/>
+          </p:cNvSpPr>
+          <p:nvPr>
+            <p:extLst>
+              <p:ext uri="{386F3935-93C4-4BCD-93E2-E3B085C9AB24}">
+                <p16:designElem xmlns:p16="http://schemas.microsoft.com/office/powerpoint/2015/main" val="1"/>
+              </p:ext>
+            </p:extLst>
+          </p:nvPr>
+        </p:nvSpPr>
+        <p:spPr>
+          <a:xfrm>
+            <a:off x="0" y="0"/>
+            <a:ext cx="12192000" cy="6858000"/>
+          </a:xfrm>
+          <a:prstGeom prst="rect">
+            <a:avLst/>
+          </a:prstGeom>
+          <a:ln>
+            <a:noFill/>
+          </a:ln>
+        </p:spPr>
+        <p:style>
+          <a:lnRef idx="2">
+            <a:schemeClr val="accent1">
+              <a:shade val="50000"/>
+            </a:schemeClr>
+          </a:lnRef>
+          <a:fillRef idx="1">
+            <a:schemeClr val="accent1"/>
+          </a:fillRef>
+          <a:effectRef idx="0">
+            <a:schemeClr val="accent1"/>
+          </a:effectRef>
+          <a:fontRef idx="minor">
+            <a:schemeClr val="lt1"/>
+          </a:fontRef>
+        </p:style>
+        <p:txBody>
+          <a:bodyPr rtlCol="0" anchor="ctr"/>
+          <a:lstStyle/>
+          <a:p>
+            <a:pPr algn="ctr"/>
+            <a:endParaRPr lang="en-US"/>
+          </a:p>
+        </p:txBody>
+      </p:sp>
+      <p:sp>
+        <p:nvSpPr>
+          <p:cNvPr id="2" name="Title 1">
+            <a:extLst>
+              <a:ext uri="{FF2B5EF4-FFF2-40B4-BE49-F238E27FC236}">
+                <a16:creationId xmlns:a16="http://schemas.microsoft.com/office/drawing/2014/main" id="{8CE328AA-C7FC-6459-BEC0-6E30890C8190}"/>
+              </a:ext>
+            </a:extLst>
+          </p:cNvPr>
+          <p:cNvSpPr>
+            <a:spLocks noGrp="1"/>
+          </p:cNvSpPr>
+          <p:nvPr>
+            <p:ph type="title"/>
+          </p:nvPr>
+        </p:nvSpPr>
+        <p:spPr>
+          <a:xfrm>
+            <a:off x="834013" y="1115568"/>
+            <a:ext cx="3487616" cy="4626864"/>
+          </a:xfrm>
+        </p:spPr>
+        <p:txBody>
+          <a:bodyPr>
+            <a:normAutofit/>
+          </a:bodyPr>
+          <a:lstStyle/>
+          <a:p>
+            <a:pPr algn="l"/>
+            <a:r>
+              <a:rPr lang="en-PH" sz="3600" dirty="0">
+                <a:latin typeface="Consolas" panose="020B0609020204030204" pitchFamily="49" charset="0"/>
+              </a:rPr>
+              <a:t>Environment Division</a:t>
+            </a:r>
+          </a:p>
+        </p:txBody>
+      </p:sp>
+      <p:cxnSp>
+        <p:nvCxnSpPr>
+          <p:cNvPr id="10" name="Straight Connector 9">
+            <a:extLst>
+              <a:ext uri="{FF2B5EF4-FFF2-40B4-BE49-F238E27FC236}">
+                <a16:creationId xmlns:a16="http://schemas.microsoft.com/office/drawing/2014/main" id="{425A0768-3044-4AA9-A889-D2CAA68C517A}"/>
+              </a:ext>
+              <a:ext uri="{C183D7F6-B498-43B3-948B-1728B52AA6E4}">
+                <adec:decorative xmlns:adec="http://schemas.microsoft.com/office/drawing/2017/decorative" val="1"/>
+              </a:ext>
+            </a:extLst>
+          </p:cNvPr>
+          <p:cNvCxnSpPr>
+            <a:cxnSpLocks noGrp="1" noRot="1" noChangeAspect="1" noMove="1" noResize="1" noEditPoints="1" noAdjustHandles="1" noChangeArrowheads="1" noChangeShapeType="1"/>
+          </p:cNvCxnSpPr>
+          <p:nvPr>
+            <p:extLst>
+              <p:ext uri="{386F3935-93C4-4BCD-93E2-E3B085C9AB24}">
+                <p16:designElem xmlns:p16="http://schemas.microsoft.com/office/powerpoint/2015/main" val="1"/>
+              </p:ext>
+            </p:extLst>
+          </p:nvPr>
+        </p:nvCxnSpPr>
+        <p:spPr>
+          <a:xfrm>
+            <a:off x="4654605" y="2057400"/>
+            <a:ext cx="0" cy="2743200"/>
+          </a:xfrm>
+          <a:prstGeom prst="line">
+            <a:avLst/>
+          </a:prstGeom>
+          <a:ln w="19050">
+            <a:solidFill>
+              <a:schemeClr val="tx2"/>
+            </a:solidFill>
+          </a:ln>
+        </p:spPr>
+        <p:style>
+          <a:lnRef idx="1">
+            <a:schemeClr val="accent1"/>
+          </a:lnRef>
+          <a:fillRef idx="0">
+            <a:schemeClr val="accent1"/>
+          </a:fillRef>
+          <a:effectRef idx="0">
+            <a:schemeClr val="accent1"/>
+          </a:effectRef>
+          <a:fontRef idx="minor">
+            <a:schemeClr val="tx1"/>
+          </a:fontRef>
+        </p:style>
+      </p:cxnSp>
+      <p:sp>
+        <p:nvSpPr>
+          <p:cNvPr id="3" name="Content Placeholder 2">
+            <a:extLst>
+              <a:ext uri="{FF2B5EF4-FFF2-40B4-BE49-F238E27FC236}">
+                <a16:creationId xmlns:a16="http://schemas.microsoft.com/office/drawing/2014/main" id="{DCBCB219-A672-A368-451B-9CBE8E238FDB}"/>
+              </a:ext>
+            </a:extLst>
+          </p:cNvPr>
+          <p:cNvSpPr>
+            <a:spLocks noGrp="1"/>
+          </p:cNvSpPr>
+          <p:nvPr>
+            <p:ph idx="1"/>
+          </p:nvPr>
+        </p:nvSpPr>
+        <p:spPr>
+          <a:xfrm>
+            <a:off x="5112635" y="946404"/>
+            <a:ext cx="6245352" cy="4965192"/>
+          </a:xfrm>
+        </p:spPr>
+        <p:txBody>
+          <a:bodyPr anchor="ctr">
+            <a:normAutofit lnSpcReduction="10000"/>
+          </a:bodyPr>
+          <a:lstStyle/>
+          <a:p>
+            <a:r>
+              <a:rPr lang="en-US" dirty="0">
+                <a:effectLst/>
+                <a:latin typeface="Consolas" panose="020B0609020204030204" pitchFamily="49" charset="0"/>
+              </a:rPr>
+              <a:t>Specifies the runtime environment for a program and defines the input and output resources it will use</a:t>
+            </a:r>
+          </a:p>
+          <a:p>
+            <a:r>
+              <a:rPr lang="en-PH" dirty="0">
+                <a:effectLst/>
+                <a:latin typeface="Consolas" panose="020B0609020204030204" pitchFamily="49" charset="0"/>
+              </a:rPr>
+              <a:t>Subdivided into two sections:</a:t>
+            </a:r>
+          </a:p>
+          <a:p>
+            <a:pPr marL="907200" lvl="1" indent="-457200">
+              <a:buFont typeface="+mj-lt"/>
+              <a:buAutoNum type="arabicPeriod"/>
+            </a:pPr>
+            <a:r>
+              <a:rPr lang="en-PH" dirty="0">
+                <a:effectLst/>
+                <a:latin typeface="Consolas" panose="020B0609020204030204" pitchFamily="49" charset="0"/>
+              </a:rPr>
+              <a:t>Configuration Section (Obsolete)</a:t>
+            </a:r>
+          </a:p>
+          <a:p>
+            <a:pPr marL="1213200" lvl="2" indent="-457200"/>
+            <a:r>
+              <a:rPr lang="en-US" dirty="0">
+                <a:effectLst/>
+                <a:latin typeface="Consolas" panose="020B0609020204030204" pitchFamily="49" charset="0"/>
+              </a:rPr>
+              <a:t>provides information about the system configuration, including the computer and compiler features it’s using</a:t>
+            </a:r>
+            <a:endParaRPr lang="en-PH" dirty="0">
+              <a:effectLst/>
+              <a:latin typeface="Consolas" panose="020B0609020204030204" pitchFamily="49" charset="0"/>
+            </a:endParaRPr>
+          </a:p>
+          <a:p>
+            <a:pPr marL="907200" lvl="1" indent="-457200">
+              <a:buFont typeface="+mj-lt"/>
+              <a:buAutoNum type="arabicPeriod"/>
+            </a:pPr>
+            <a:r>
+              <a:rPr lang="en-PH" dirty="0">
+                <a:effectLst/>
+                <a:latin typeface="Consolas" panose="020B0609020204030204" pitchFamily="49" charset="0"/>
+              </a:rPr>
+              <a:t>Input-Output Section</a:t>
+            </a:r>
+          </a:p>
+          <a:p>
+            <a:pPr marL="1213200" lvl="2" indent="-457200"/>
+            <a:r>
+              <a:rPr lang="en-US" dirty="0">
+                <a:effectLst/>
+                <a:latin typeface="Consolas" panose="020B0609020204030204" pitchFamily="49" charset="0"/>
+              </a:rPr>
+              <a:t>specifies the files and associated devices that the program can interact with</a:t>
+            </a:r>
+          </a:p>
+          <a:p>
+            <a:pPr marL="1213200" lvl="2" indent="-457200"/>
+            <a:r>
+              <a:rPr lang="en-US" dirty="0">
+                <a:effectLst/>
+                <a:latin typeface="Consolas" panose="020B0609020204030204" pitchFamily="49" charset="0"/>
+              </a:rPr>
+              <a:t>includes the FILE-CONTROL paragraph and the I-O-CONTROL paragraph</a:t>
+            </a:r>
+          </a:p>
+        </p:txBody>
+      </p:sp>
+    </p:spTree>
+    <p:extLst>
+      <p:ext uri="{BB962C8B-B14F-4D97-AF65-F5344CB8AC3E}">
+        <p14:creationId xmlns:p14="http://schemas.microsoft.com/office/powerpoint/2010/main" val="81571069"/>
+      </p:ext>
+    </p:extLst>
+  </p:cSld>
+  <p:clrMapOvr>
+    <a:masterClrMapping/>
+  </p:clrMapOvr>
+</p:sld>
+</file>
+
+<file path=ppt/slides/slide11.xml><?xml version="1.0" encoding="utf-8"?>
+<p:sld xmlns:a="http://schemas.openxmlformats.org/drawingml/2006/main" xmlns:r="http://schemas.openxmlformats.org/officeDocument/2006/relationships" xmlns:p="http://schemas.openxmlformats.org/presentationml/2006/main">
+  <p:cSld>
+    <p:bg>
+      <p:bgPr>
+        <a:blipFill rotWithShape="1">
+          <a:blip r:embed="rId2">
+            <a:duotone>
+              <a:schemeClr val="bg1">
+                <a:shade val="80000"/>
+                <a:lumMod val="80000"/>
+              </a:schemeClr>
+              <a:schemeClr val="bg1">
+                <a:tint val="98000"/>
+              </a:schemeClr>
+            </a:duotone>
+          </a:blip>
+          <a:stretch/>
+        </a:blipFill>
+        <a:effectLst/>
+      </p:bgPr>
+    </p:bg>
+    <p:spTree>
+      <p:nvGrpSpPr>
+        <p:cNvPr id="1" name="">
+          <a:extLst>
+            <a:ext uri="{FF2B5EF4-FFF2-40B4-BE49-F238E27FC236}">
+              <a16:creationId xmlns:a16="http://schemas.microsoft.com/office/drawing/2014/main" id="{ABAF03CE-F2A8-C3D8-FC2B-5B3C17A062C8}"/>
+            </a:ext>
+          </a:extLst>
+        </p:cNvPr>
+        <p:cNvGrpSpPr/>
+        <p:nvPr/>
+      </p:nvGrpSpPr>
+      <p:grpSpPr>
+        <a:xfrm>
+          <a:off x="0" y="0"/>
+          <a:ext cx="0" cy="0"/>
+          <a:chOff x="0" y="0"/>
+          <a:chExt cx="0" cy="0"/>
+        </a:xfrm>
+      </p:grpSpPr>
+      <p:sp useBgFill="1">
+        <p:nvSpPr>
+          <p:cNvPr id="8" name="Rectangle 7">
+            <a:extLst>
+              <a:ext uri="{FF2B5EF4-FFF2-40B4-BE49-F238E27FC236}">
+                <a16:creationId xmlns:a16="http://schemas.microsoft.com/office/drawing/2014/main" id="{05E12125-FEDF-A471-111F-8AC37CE3F0F8}"/>
+              </a:ext>
+              <a:ext uri="{C183D7F6-B498-43B3-948B-1728B52AA6E4}">
+                <adec:decorative xmlns:adec="http://schemas.microsoft.com/office/drawing/2017/decorative" val="1"/>
+              </a:ext>
+            </a:extLst>
+          </p:cNvPr>
+          <p:cNvSpPr>
+            <a:spLocks noGrp="1" noRot="1" noChangeAspect="1" noMove="1" noResize="1" noEditPoints="1" noAdjustHandles="1" noChangeArrowheads="1" noChangeShapeType="1" noTextEdit="1"/>
+          </p:cNvSpPr>
+          <p:nvPr>
+            <p:extLst>
+              <p:ext uri="{386F3935-93C4-4BCD-93E2-E3B085C9AB24}">
+                <p16:designElem xmlns:p16="http://schemas.microsoft.com/office/powerpoint/2015/main" val="1"/>
+              </p:ext>
+            </p:extLst>
+          </p:nvPr>
+        </p:nvSpPr>
+        <p:spPr>
+          <a:xfrm>
+            <a:off x="0" y="0"/>
+            <a:ext cx="12192000" cy="6858000"/>
+          </a:xfrm>
+          <a:prstGeom prst="rect">
+            <a:avLst/>
+          </a:prstGeom>
+          <a:ln>
+            <a:noFill/>
+          </a:ln>
+        </p:spPr>
+        <p:style>
+          <a:lnRef idx="2">
+            <a:schemeClr val="accent1">
+              <a:shade val="50000"/>
+            </a:schemeClr>
+          </a:lnRef>
+          <a:fillRef idx="1">
+            <a:schemeClr val="accent1"/>
+          </a:fillRef>
+          <a:effectRef idx="0">
+            <a:schemeClr val="accent1"/>
+          </a:effectRef>
+          <a:fontRef idx="minor">
+            <a:schemeClr val="lt1"/>
+          </a:fontRef>
+        </p:style>
+        <p:txBody>
+          <a:bodyPr rtlCol="0" anchor="ctr"/>
+          <a:lstStyle/>
+          <a:p>
+            <a:pPr algn="ctr"/>
+            <a:endParaRPr lang="en-US"/>
+          </a:p>
+        </p:txBody>
+      </p:sp>
+      <p:sp>
+        <p:nvSpPr>
+          <p:cNvPr id="2" name="Title 1">
+            <a:extLst>
+              <a:ext uri="{FF2B5EF4-FFF2-40B4-BE49-F238E27FC236}">
+                <a16:creationId xmlns:a16="http://schemas.microsoft.com/office/drawing/2014/main" id="{554CB5E9-29E6-C6FA-5CA0-BE7A738C13B2}"/>
+              </a:ext>
+            </a:extLst>
+          </p:cNvPr>
+          <p:cNvSpPr>
+            <a:spLocks noGrp="1"/>
+          </p:cNvSpPr>
+          <p:nvPr>
+            <p:ph type="title"/>
+          </p:nvPr>
+        </p:nvSpPr>
+        <p:spPr>
+          <a:xfrm>
+            <a:off x="834013" y="1115568"/>
+            <a:ext cx="3487616" cy="4626864"/>
+          </a:xfrm>
+        </p:spPr>
+        <p:txBody>
+          <a:bodyPr>
+            <a:normAutofit/>
+          </a:bodyPr>
+          <a:lstStyle/>
+          <a:p>
+            <a:pPr algn="l"/>
+            <a:r>
+              <a:rPr lang="en-PH" sz="3600" dirty="0">
+                <a:latin typeface="Consolas" panose="020B0609020204030204" pitchFamily="49" charset="0"/>
+              </a:rPr>
+              <a:t>Data</a:t>
+            </a:r>
+            <a:br>
+              <a:rPr lang="en-PH" sz="3600" dirty="0">
+                <a:latin typeface="Consolas" panose="020B0609020204030204" pitchFamily="49" charset="0"/>
+              </a:rPr>
+            </a:br>
+            <a:r>
+              <a:rPr lang="en-PH" sz="3600" dirty="0">
+                <a:latin typeface="Consolas" panose="020B0609020204030204" pitchFamily="49" charset="0"/>
+              </a:rPr>
+              <a:t>Division</a:t>
+            </a:r>
+          </a:p>
+        </p:txBody>
+      </p:sp>
+      <p:cxnSp>
+        <p:nvCxnSpPr>
+          <p:cNvPr id="10" name="Straight Connector 9">
+            <a:extLst>
+              <a:ext uri="{FF2B5EF4-FFF2-40B4-BE49-F238E27FC236}">
+                <a16:creationId xmlns:a16="http://schemas.microsoft.com/office/drawing/2014/main" id="{11CDD856-9DA2-88C2-78F6-9BC606C36D0B}"/>
+              </a:ext>
+              <a:ext uri="{C183D7F6-B498-43B3-948B-1728B52AA6E4}">
+                <adec:decorative xmlns:adec="http://schemas.microsoft.com/office/drawing/2017/decorative" val="1"/>
+              </a:ext>
+            </a:extLst>
+          </p:cNvPr>
+          <p:cNvCxnSpPr>
+            <a:cxnSpLocks noGrp="1" noRot="1" noChangeAspect="1" noMove="1" noResize="1" noEditPoints="1" noAdjustHandles="1" noChangeArrowheads="1" noChangeShapeType="1"/>
+          </p:cNvCxnSpPr>
+          <p:nvPr>
+            <p:extLst>
+              <p:ext uri="{386F3935-93C4-4BCD-93E2-E3B085C9AB24}">
+                <p16:designElem xmlns:p16="http://schemas.microsoft.com/office/powerpoint/2015/main" val="1"/>
+              </p:ext>
+            </p:extLst>
+          </p:nvPr>
+        </p:nvCxnSpPr>
+        <p:spPr>
+          <a:xfrm>
+            <a:off x="4654605" y="2057400"/>
+            <a:ext cx="0" cy="2743200"/>
+          </a:xfrm>
+          <a:prstGeom prst="line">
+            <a:avLst/>
+          </a:prstGeom>
+          <a:ln w="19050">
+            <a:solidFill>
+              <a:schemeClr val="tx2"/>
+            </a:solidFill>
+          </a:ln>
+        </p:spPr>
+        <p:style>
+          <a:lnRef idx="1">
+            <a:schemeClr val="accent1"/>
+          </a:lnRef>
+          <a:fillRef idx="0">
+            <a:schemeClr val="accent1"/>
+          </a:fillRef>
+          <a:effectRef idx="0">
+            <a:schemeClr val="accent1"/>
+          </a:effectRef>
+          <a:fontRef idx="minor">
+            <a:schemeClr val="tx1"/>
+          </a:fontRef>
+        </p:style>
+      </p:cxnSp>
+      <p:sp>
+        <p:nvSpPr>
+          <p:cNvPr id="3" name="Content Placeholder 2">
+            <a:extLst>
+              <a:ext uri="{FF2B5EF4-FFF2-40B4-BE49-F238E27FC236}">
+                <a16:creationId xmlns:a16="http://schemas.microsoft.com/office/drawing/2014/main" id="{DCECB615-B241-8EC6-BFE9-F919710CEE47}"/>
+              </a:ext>
+            </a:extLst>
+          </p:cNvPr>
+          <p:cNvSpPr>
+            <a:spLocks noGrp="1"/>
+          </p:cNvSpPr>
+          <p:nvPr>
+            <p:ph idx="1"/>
+          </p:nvPr>
+        </p:nvSpPr>
+        <p:spPr>
+          <a:xfrm>
+            <a:off x="5105398" y="1115568"/>
+            <a:ext cx="6245352" cy="4626864"/>
+          </a:xfrm>
+        </p:spPr>
+        <p:txBody>
+          <a:bodyPr anchor="ctr">
+            <a:normAutofit/>
+          </a:bodyPr>
+          <a:lstStyle/>
+          <a:p>
+            <a:pPr lvl="1"/>
+            <a:r>
+              <a:rPr lang="en-US" dirty="0">
+                <a:effectLst/>
+                <a:latin typeface="Consolas" panose="020B0609020204030204" pitchFamily="49" charset="0"/>
+              </a:rPr>
+              <a:t>Houses all variable, file and constant definitions for the program</a:t>
+            </a:r>
+          </a:p>
+          <a:p>
+            <a:pPr lvl="1"/>
+            <a:r>
+              <a:rPr lang="en-US" dirty="0">
+                <a:effectLst/>
+                <a:latin typeface="Consolas" panose="020B0609020204030204" pitchFamily="49" charset="0"/>
+              </a:rPr>
+              <a:t>Subdivided into four main sections:</a:t>
+            </a:r>
+          </a:p>
+          <a:p>
+            <a:pPr lvl="2"/>
+            <a:r>
+              <a:rPr lang="en-US" dirty="0">
+                <a:effectLst/>
+                <a:latin typeface="Consolas" panose="020B0609020204030204" pitchFamily="49" charset="0"/>
+              </a:rPr>
+              <a:t>FILE Section</a:t>
+            </a:r>
+          </a:p>
+          <a:p>
+            <a:pPr lvl="2"/>
+            <a:r>
+              <a:rPr lang="en-US" dirty="0">
+                <a:effectLst/>
+                <a:latin typeface="Consolas" panose="020B0609020204030204" pitchFamily="49" charset="0"/>
+              </a:rPr>
+              <a:t>WORKING-STORAGE Section</a:t>
+            </a:r>
+          </a:p>
+          <a:p>
+            <a:pPr lvl="2"/>
+            <a:r>
+              <a:rPr lang="en-PH" dirty="0">
+                <a:latin typeface="Consolas" panose="020B0609020204030204" pitchFamily="49" charset="0"/>
+              </a:rPr>
+              <a:t>LOCAL-STORAGE Section</a:t>
+            </a:r>
+          </a:p>
+          <a:p>
+            <a:pPr lvl="2"/>
+            <a:r>
+              <a:rPr lang="en-PH" dirty="0">
+                <a:latin typeface="Consolas" panose="020B0609020204030204" pitchFamily="49" charset="0"/>
+              </a:rPr>
+              <a:t>LINKAGE Section</a:t>
+            </a:r>
+          </a:p>
+        </p:txBody>
+      </p:sp>
+    </p:spTree>
+    <p:extLst>
+      <p:ext uri="{BB962C8B-B14F-4D97-AF65-F5344CB8AC3E}">
+        <p14:creationId xmlns:p14="http://schemas.microsoft.com/office/powerpoint/2010/main" val="651052198"/>
+      </p:ext>
+    </p:extLst>
+  </p:cSld>
+  <p:clrMapOvr>
+    <a:masterClrMapping/>
+  </p:clrMapOvr>
+</p:sld>
+</file>
+
+<file path=ppt/slides/slide12.xml><?xml version="1.0" encoding="utf-8"?>
+<p:sld xmlns:a="http://schemas.openxmlformats.org/drawingml/2006/main" xmlns:r="http://schemas.openxmlformats.org/officeDocument/2006/relationships" xmlns:p="http://schemas.openxmlformats.org/presentationml/2006/main">
+  <p:cSld>
+    <p:bg>
+      <p:bgPr>
+        <a:blipFill rotWithShape="1">
+          <a:blip r:embed="rId2">
+            <a:duotone>
+              <a:schemeClr val="bg1">
+                <a:shade val="80000"/>
+                <a:lumMod val="80000"/>
+              </a:schemeClr>
+              <a:schemeClr val="bg1">
+                <a:tint val="98000"/>
+              </a:schemeClr>
+            </a:duotone>
+          </a:blip>
+          <a:stretch/>
+        </a:blipFill>
+        <a:effectLst/>
+      </p:bgPr>
+    </p:bg>
+    <p:spTree>
+      <p:nvGrpSpPr>
+        <p:cNvPr id="1" name="">
+          <a:extLst>
+            <a:ext uri="{FF2B5EF4-FFF2-40B4-BE49-F238E27FC236}">
+              <a16:creationId xmlns:a16="http://schemas.microsoft.com/office/drawing/2014/main" id="{EC1BF783-0E6B-8F49-C0C8-4E8210E89068}"/>
+            </a:ext>
+          </a:extLst>
+        </p:cNvPr>
+        <p:cNvGrpSpPr/>
+        <p:nvPr/>
+      </p:nvGrpSpPr>
+      <p:grpSpPr>
+        <a:xfrm>
+          <a:off x="0" y="0"/>
+          <a:ext cx="0" cy="0"/>
+          <a:chOff x="0" y="0"/>
+          <a:chExt cx="0" cy="0"/>
+        </a:xfrm>
+      </p:grpSpPr>
+      <p:sp useBgFill="1">
+        <p:nvSpPr>
+          <p:cNvPr id="8" name="Rectangle 7">
+            <a:extLst>
+              <a:ext uri="{FF2B5EF4-FFF2-40B4-BE49-F238E27FC236}">
+                <a16:creationId xmlns:a16="http://schemas.microsoft.com/office/drawing/2014/main" id="{2FBA2CFB-2CB8-C7D6-CFB0-B33B668EA74A}"/>
+              </a:ext>
+              <a:ext uri="{C183D7F6-B498-43B3-948B-1728B52AA6E4}">
+                <adec:decorative xmlns:adec="http://schemas.microsoft.com/office/drawing/2017/decorative" val="1"/>
+              </a:ext>
+            </a:extLst>
+          </p:cNvPr>
+          <p:cNvSpPr>
+            <a:spLocks noGrp="1" noRot="1" noChangeAspect="1" noMove="1" noResize="1" noEditPoints="1" noAdjustHandles="1" noChangeArrowheads="1" noChangeShapeType="1" noTextEdit="1"/>
+          </p:cNvSpPr>
+          <p:nvPr>
+            <p:extLst>
+              <p:ext uri="{386F3935-93C4-4BCD-93E2-E3B085C9AB24}">
+                <p16:designElem xmlns:p16="http://schemas.microsoft.com/office/powerpoint/2015/main" val="1"/>
+              </p:ext>
+            </p:extLst>
+          </p:nvPr>
+        </p:nvSpPr>
+        <p:spPr>
+          <a:xfrm>
+            <a:off x="0" y="0"/>
+            <a:ext cx="12192000" cy="6858000"/>
+          </a:xfrm>
+          <a:prstGeom prst="rect">
+            <a:avLst/>
+          </a:prstGeom>
+          <a:ln>
+            <a:noFill/>
+          </a:ln>
+        </p:spPr>
+        <p:style>
+          <a:lnRef idx="2">
+            <a:schemeClr val="accent1">
+              <a:shade val="50000"/>
+            </a:schemeClr>
+          </a:lnRef>
+          <a:fillRef idx="1">
+            <a:schemeClr val="accent1"/>
+          </a:fillRef>
+          <a:effectRef idx="0">
+            <a:schemeClr val="accent1"/>
+          </a:effectRef>
+          <a:fontRef idx="minor">
+            <a:schemeClr val="lt1"/>
+          </a:fontRef>
+        </p:style>
+        <p:txBody>
+          <a:bodyPr rtlCol="0" anchor="ctr"/>
+          <a:lstStyle/>
+          <a:p>
+            <a:pPr algn="ctr"/>
+            <a:endParaRPr lang="en-US"/>
+          </a:p>
+        </p:txBody>
+      </p:sp>
+      <p:sp>
+        <p:nvSpPr>
+          <p:cNvPr id="2" name="Title 1">
+            <a:extLst>
+              <a:ext uri="{FF2B5EF4-FFF2-40B4-BE49-F238E27FC236}">
+                <a16:creationId xmlns:a16="http://schemas.microsoft.com/office/drawing/2014/main" id="{2F54E7C1-18D8-6B1A-7A7D-32E4948D34F6}"/>
+              </a:ext>
+            </a:extLst>
+          </p:cNvPr>
+          <p:cNvSpPr>
+            <a:spLocks noGrp="1"/>
+          </p:cNvSpPr>
+          <p:nvPr>
+            <p:ph type="title"/>
+          </p:nvPr>
+        </p:nvSpPr>
+        <p:spPr>
+          <a:xfrm>
+            <a:off x="834013" y="1115568"/>
+            <a:ext cx="3487616" cy="4626864"/>
+          </a:xfrm>
+        </p:spPr>
+        <p:txBody>
+          <a:bodyPr>
+            <a:normAutofit/>
+          </a:bodyPr>
+          <a:lstStyle/>
+          <a:p>
+            <a:pPr algn="l"/>
+            <a:r>
+              <a:rPr lang="en-PH" sz="3600" dirty="0">
+                <a:latin typeface="Consolas" panose="020B0609020204030204" pitchFamily="49" charset="0"/>
+              </a:rPr>
+              <a:t>Data</a:t>
+            </a:r>
+            <a:br>
+              <a:rPr lang="en-PH" sz="3600" dirty="0">
+                <a:latin typeface="Consolas" panose="020B0609020204030204" pitchFamily="49" charset="0"/>
+              </a:rPr>
+            </a:br>
+            <a:r>
+              <a:rPr lang="en-PH" sz="3600" dirty="0">
+                <a:latin typeface="Consolas" panose="020B0609020204030204" pitchFamily="49" charset="0"/>
+              </a:rPr>
+              <a:t>Division</a:t>
+            </a:r>
+          </a:p>
+        </p:txBody>
+      </p:sp>
+      <p:cxnSp>
+        <p:nvCxnSpPr>
+          <p:cNvPr id="10" name="Straight Connector 9">
+            <a:extLst>
+              <a:ext uri="{FF2B5EF4-FFF2-40B4-BE49-F238E27FC236}">
+                <a16:creationId xmlns:a16="http://schemas.microsoft.com/office/drawing/2014/main" id="{90AD1E75-F79E-7D22-DD88-F7411FFB08DD}"/>
+              </a:ext>
+              <a:ext uri="{C183D7F6-B498-43B3-948B-1728B52AA6E4}">
+                <adec:decorative xmlns:adec="http://schemas.microsoft.com/office/drawing/2017/decorative" val="1"/>
+              </a:ext>
+            </a:extLst>
+          </p:cNvPr>
+          <p:cNvCxnSpPr>
+            <a:cxnSpLocks noGrp="1" noRot="1" noChangeAspect="1" noMove="1" noResize="1" noEditPoints="1" noAdjustHandles="1" noChangeArrowheads="1" noChangeShapeType="1"/>
+          </p:cNvCxnSpPr>
+          <p:nvPr>
+            <p:extLst>
+              <p:ext uri="{386F3935-93C4-4BCD-93E2-E3B085C9AB24}">
+                <p16:designElem xmlns:p16="http://schemas.microsoft.com/office/powerpoint/2015/main" val="1"/>
+              </p:ext>
+            </p:extLst>
+          </p:nvPr>
+        </p:nvCxnSpPr>
+        <p:spPr>
+          <a:xfrm>
+            <a:off x="4654605" y="2057400"/>
+            <a:ext cx="0" cy="2743200"/>
+          </a:xfrm>
+          <a:prstGeom prst="line">
+            <a:avLst/>
+          </a:prstGeom>
+          <a:ln w="19050">
+            <a:solidFill>
+              <a:schemeClr val="tx2"/>
+            </a:solidFill>
+          </a:ln>
+        </p:spPr>
+        <p:style>
+          <a:lnRef idx="1">
+            <a:schemeClr val="accent1"/>
+          </a:lnRef>
+          <a:fillRef idx="0">
+            <a:schemeClr val="accent1"/>
+          </a:fillRef>
+          <a:effectRef idx="0">
+            <a:schemeClr val="accent1"/>
+          </a:effectRef>
+          <a:fontRef idx="minor">
+            <a:schemeClr val="tx1"/>
+          </a:fontRef>
+        </p:style>
+      </p:cxnSp>
+      <p:sp>
+        <p:nvSpPr>
+          <p:cNvPr id="3" name="Content Placeholder 2">
+            <a:extLst>
+              <a:ext uri="{FF2B5EF4-FFF2-40B4-BE49-F238E27FC236}">
+                <a16:creationId xmlns:a16="http://schemas.microsoft.com/office/drawing/2014/main" id="{7FA146A6-A297-EBF6-55BB-707AD3AEE44C}"/>
+              </a:ext>
+            </a:extLst>
+          </p:cNvPr>
+          <p:cNvSpPr>
+            <a:spLocks noGrp="1"/>
+          </p:cNvSpPr>
+          <p:nvPr>
+            <p:ph idx="1"/>
+          </p:nvPr>
+        </p:nvSpPr>
+        <p:spPr>
+          <a:xfrm>
+            <a:off x="4987582" y="969264"/>
+            <a:ext cx="6245352" cy="4919472"/>
+          </a:xfrm>
+        </p:spPr>
+        <p:txBody>
+          <a:bodyPr anchor="ctr">
+            <a:normAutofit lnSpcReduction="10000"/>
+          </a:bodyPr>
+          <a:lstStyle/>
+          <a:p>
+            <a:pPr lvl="1"/>
+            <a:r>
+              <a:rPr lang="en-PH" dirty="0">
+                <a:effectLst/>
+                <a:latin typeface="Consolas" panose="020B0609020204030204" pitchFamily="49" charset="0"/>
+              </a:rPr>
+              <a:t>FILE SECTION - </a:t>
+            </a:r>
+            <a:r>
+              <a:rPr lang="en-US" dirty="0">
+                <a:effectLst/>
+                <a:latin typeface="Consolas" panose="020B0609020204030204" pitchFamily="49" charset="0"/>
+              </a:rPr>
+              <a:t>lists every file that the program will read from or write to</a:t>
+            </a:r>
+          </a:p>
+          <a:p>
+            <a:pPr lvl="1"/>
+            <a:r>
+              <a:rPr lang="en-US" dirty="0">
+                <a:effectLst/>
+                <a:latin typeface="Consolas" panose="020B0609020204030204" pitchFamily="49" charset="0"/>
+              </a:rPr>
+              <a:t>WORKING-STORAGE SECTION - defines variables that maintain their values throughout the run of the program</a:t>
+            </a:r>
+          </a:p>
+          <a:p>
+            <a:pPr lvl="1"/>
+            <a:r>
+              <a:rPr lang="en-US" dirty="0">
+                <a:effectLst/>
+                <a:latin typeface="Consolas" panose="020B0609020204030204" pitchFamily="49" charset="0"/>
+              </a:rPr>
+              <a:t>LOCAL-STORAGE SECTION - defines variables allocated upon deployment of the program or method and deallocated upon termination; useful for recursive algorithms and reentrant programs</a:t>
+            </a:r>
+          </a:p>
+          <a:p>
+            <a:pPr lvl="1"/>
+            <a:r>
+              <a:rPr lang="en-US" dirty="0">
+                <a:effectLst/>
+                <a:latin typeface="Consolas" panose="020B0609020204030204" pitchFamily="49" charset="0"/>
+              </a:rPr>
+              <a:t>LINKAGE SECTION - defines data items that pass from one program to another</a:t>
+            </a:r>
+            <a:endParaRPr lang="en-PH" dirty="0">
+              <a:latin typeface="Consolas" panose="020B0609020204030204" pitchFamily="49" charset="0"/>
+            </a:endParaRPr>
+          </a:p>
+        </p:txBody>
+      </p:sp>
+    </p:spTree>
+    <p:extLst>
+      <p:ext uri="{BB962C8B-B14F-4D97-AF65-F5344CB8AC3E}">
+        <p14:creationId xmlns:p14="http://schemas.microsoft.com/office/powerpoint/2010/main" val="1602033573"/>
+      </p:ext>
+    </p:extLst>
+  </p:cSld>
+  <p:clrMapOvr>
+    <a:masterClrMapping/>
+  </p:clrMapOvr>
+</p:sld>
+</file>
+
+<file path=ppt/slides/slide13.xml><?xml version="1.0" encoding="utf-8"?>
+<p:sld xmlns:a="http://schemas.openxmlformats.org/drawingml/2006/main" xmlns:r="http://schemas.openxmlformats.org/officeDocument/2006/relationships" xmlns:p="http://schemas.openxmlformats.org/presentationml/2006/main">
+  <p:cSld>
+    <p:bg>
+      <p:bgPr>
+        <a:blipFill rotWithShape="1">
+          <a:blip r:embed="rId2">
+            <a:duotone>
+              <a:schemeClr val="bg1">
+                <a:shade val="80000"/>
+                <a:lumMod val="80000"/>
+              </a:schemeClr>
+              <a:schemeClr val="bg1">
+                <a:tint val="98000"/>
+              </a:schemeClr>
+            </a:duotone>
+          </a:blip>
+          <a:stretch/>
+        </a:blipFill>
+        <a:effectLst/>
+      </p:bgPr>
+    </p:bg>
+    <p:spTree>
+      <p:nvGrpSpPr>
+        <p:cNvPr id="1" name="">
+          <a:extLst>
+            <a:ext uri="{FF2B5EF4-FFF2-40B4-BE49-F238E27FC236}">
+              <a16:creationId xmlns:a16="http://schemas.microsoft.com/office/drawing/2014/main" id="{CA2E1D45-1DA0-E53A-F5DA-7B8365E54241}"/>
+            </a:ext>
+          </a:extLst>
+        </p:cNvPr>
+        <p:cNvGrpSpPr/>
+        <p:nvPr/>
+      </p:nvGrpSpPr>
+      <p:grpSpPr>
+        <a:xfrm>
+          <a:off x="0" y="0"/>
+          <a:ext cx="0" cy="0"/>
+          <a:chOff x="0" y="0"/>
+          <a:chExt cx="0" cy="0"/>
+        </a:xfrm>
+      </p:grpSpPr>
+      <p:sp useBgFill="1">
+        <p:nvSpPr>
+          <p:cNvPr id="8" name="Rectangle 7">
+            <a:extLst>
+              <a:ext uri="{FF2B5EF4-FFF2-40B4-BE49-F238E27FC236}">
+                <a16:creationId xmlns:a16="http://schemas.microsoft.com/office/drawing/2014/main" id="{5C19C5A8-0D0E-2A43-AAA8-04E5069F6F75}"/>
+              </a:ext>
+              <a:ext uri="{C183D7F6-B498-43B3-948B-1728B52AA6E4}">
+                <adec:decorative xmlns:adec="http://schemas.microsoft.com/office/drawing/2017/decorative" val="1"/>
+              </a:ext>
+            </a:extLst>
+          </p:cNvPr>
+          <p:cNvSpPr>
+            <a:spLocks noGrp="1" noRot="1" noChangeAspect="1" noMove="1" noResize="1" noEditPoints="1" noAdjustHandles="1" noChangeArrowheads="1" noChangeShapeType="1" noTextEdit="1"/>
+          </p:cNvSpPr>
+          <p:nvPr>
+            <p:extLst>
+              <p:ext uri="{386F3935-93C4-4BCD-93E2-E3B085C9AB24}">
+                <p16:designElem xmlns:p16="http://schemas.microsoft.com/office/powerpoint/2015/main" val="1"/>
+              </p:ext>
+            </p:extLst>
+          </p:nvPr>
+        </p:nvSpPr>
+        <p:spPr>
+          <a:xfrm>
+            <a:off x="0" y="0"/>
+            <a:ext cx="12192000" cy="6858000"/>
+          </a:xfrm>
+          <a:prstGeom prst="rect">
+            <a:avLst/>
+          </a:prstGeom>
+          <a:ln>
+            <a:noFill/>
+          </a:ln>
+        </p:spPr>
+        <p:style>
+          <a:lnRef idx="2">
+            <a:schemeClr val="accent1">
+              <a:shade val="50000"/>
+            </a:schemeClr>
+          </a:lnRef>
+          <a:fillRef idx="1">
+            <a:schemeClr val="accent1"/>
+          </a:fillRef>
+          <a:effectRef idx="0">
+            <a:schemeClr val="accent1"/>
+          </a:effectRef>
+          <a:fontRef idx="minor">
+            <a:schemeClr val="lt1"/>
+          </a:fontRef>
+        </p:style>
+        <p:txBody>
+          <a:bodyPr rtlCol="0" anchor="ctr"/>
+          <a:lstStyle/>
+          <a:p>
+            <a:pPr algn="ctr"/>
+            <a:endParaRPr lang="en-US"/>
+          </a:p>
+        </p:txBody>
+      </p:sp>
+      <p:sp>
+        <p:nvSpPr>
+          <p:cNvPr id="2" name="Title 1">
+            <a:extLst>
+              <a:ext uri="{FF2B5EF4-FFF2-40B4-BE49-F238E27FC236}">
+                <a16:creationId xmlns:a16="http://schemas.microsoft.com/office/drawing/2014/main" id="{A7CCA2F2-9D78-77F6-9CF9-AC253829DC25}"/>
+              </a:ext>
+            </a:extLst>
+          </p:cNvPr>
+          <p:cNvSpPr>
+            <a:spLocks noGrp="1"/>
+          </p:cNvSpPr>
+          <p:nvPr>
+            <p:ph type="title"/>
+          </p:nvPr>
+        </p:nvSpPr>
+        <p:spPr>
+          <a:xfrm>
+            <a:off x="834013" y="1115568"/>
+            <a:ext cx="3487616" cy="4626864"/>
+          </a:xfrm>
+        </p:spPr>
+        <p:txBody>
+          <a:bodyPr>
+            <a:normAutofit/>
+          </a:bodyPr>
+          <a:lstStyle/>
+          <a:p>
+            <a:pPr algn="l"/>
+            <a:r>
+              <a:rPr lang="en-PH" sz="3600" dirty="0">
+                <a:latin typeface="Consolas" panose="020B0609020204030204" pitchFamily="49" charset="0"/>
+              </a:rPr>
+              <a:t>Procedure</a:t>
+            </a:r>
+            <a:br>
+              <a:rPr lang="en-PH" sz="3600" dirty="0">
+                <a:latin typeface="Consolas" panose="020B0609020204030204" pitchFamily="49" charset="0"/>
+              </a:rPr>
+            </a:br>
+            <a:r>
+              <a:rPr lang="en-PH" sz="3600" dirty="0">
+                <a:latin typeface="Consolas" panose="020B0609020204030204" pitchFamily="49" charset="0"/>
+              </a:rPr>
+              <a:t>Division</a:t>
+            </a:r>
+          </a:p>
+        </p:txBody>
+      </p:sp>
+      <p:cxnSp>
+        <p:nvCxnSpPr>
+          <p:cNvPr id="10" name="Straight Connector 9">
+            <a:extLst>
+              <a:ext uri="{FF2B5EF4-FFF2-40B4-BE49-F238E27FC236}">
+                <a16:creationId xmlns:a16="http://schemas.microsoft.com/office/drawing/2014/main" id="{7D37072E-2D84-1A7D-0ED4-8C17BAE7272A}"/>
+              </a:ext>
+              <a:ext uri="{C183D7F6-B498-43B3-948B-1728B52AA6E4}">
+                <adec:decorative xmlns:adec="http://schemas.microsoft.com/office/drawing/2017/decorative" val="1"/>
+              </a:ext>
+            </a:extLst>
+          </p:cNvPr>
+          <p:cNvCxnSpPr>
+            <a:cxnSpLocks noGrp="1" noRot="1" noChangeAspect="1" noMove="1" noResize="1" noEditPoints="1" noAdjustHandles="1" noChangeArrowheads="1" noChangeShapeType="1"/>
+          </p:cNvCxnSpPr>
+          <p:nvPr>
+            <p:extLst>
+              <p:ext uri="{386F3935-93C4-4BCD-93E2-E3B085C9AB24}">
+                <p16:designElem xmlns:p16="http://schemas.microsoft.com/office/powerpoint/2015/main" val="1"/>
+              </p:ext>
+            </p:extLst>
+          </p:nvPr>
+        </p:nvCxnSpPr>
+        <p:spPr>
+          <a:xfrm>
+            <a:off x="4654605" y="2057400"/>
+            <a:ext cx="0" cy="2743200"/>
+          </a:xfrm>
+          <a:prstGeom prst="line">
+            <a:avLst/>
+          </a:prstGeom>
+          <a:ln w="19050">
+            <a:solidFill>
+              <a:schemeClr val="tx2"/>
+            </a:solidFill>
+          </a:ln>
+        </p:spPr>
+        <p:style>
+          <a:lnRef idx="1">
+            <a:schemeClr val="accent1"/>
+          </a:lnRef>
+          <a:fillRef idx="0">
+            <a:schemeClr val="accent1"/>
+          </a:fillRef>
+          <a:effectRef idx="0">
+            <a:schemeClr val="accent1"/>
+          </a:effectRef>
+          <a:fontRef idx="minor">
+            <a:schemeClr val="tx1"/>
+          </a:fontRef>
+        </p:style>
+      </p:cxnSp>
+      <p:sp>
+        <p:nvSpPr>
+          <p:cNvPr id="3" name="Content Placeholder 2">
+            <a:extLst>
+              <a:ext uri="{FF2B5EF4-FFF2-40B4-BE49-F238E27FC236}">
+                <a16:creationId xmlns:a16="http://schemas.microsoft.com/office/drawing/2014/main" id="{F03F6C34-5E24-C118-A90C-D83763A91C96}"/>
+              </a:ext>
+            </a:extLst>
+          </p:cNvPr>
+          <p:cNvSpPr>
+            <a:spLocks noGrp="1"/>
+          </p:cNvSpPr>
+          <p:nvPr>
+            <p:ph idx="1"/>
+          </p:nvPr>
+        </p:nvSpPr>
+        <p:spPr>
+          <a:xfrm>
+            <a:off x="4987582" y="969264"/>
+            <a:ext cx="6245352" cy="4919472"/>
+          </a:xfrm>
+        </p:spPr>
+        <p:txBody>
+          <a:bodyPr anchor="ctr">
+            <a:normAutofit/>
+          </a:bodyPr>
+          <a:lstStyle/>
+          <a:p>
+            <a:pPr lvl="1"/>
+            <a:r>
+              <a:rPr lang="en-US" dirty="0">
+                <a:effectLst/>
+                <a:latin typeface="Consolas" panose="020B0609020204030204" pitchFamily="49" charset="0"/>
+              </a:rPr>
+              <a:t>contains the executable code of the program, that is divided into paragraphs and sections that structure the code into code blocks for better readability and easier maintenance</a:t>
+            </a:r>
+            <a:endParaRPr lang="en-PH" dirty="0">
+              <a:latin typeface="Consolas" panose="020B0609020204030204" pitchFamily="49" charset="0"/>
+            </a:endParaRPr>
+          </a:p>
+        </p:txBody>
+      </p:sp>
+    </p:spTree>
+    <p:extLst>
+      <p:ext uri="{BB962C8B-B14F-4D97-AF65-F5344CB8AC3E}">
+        <p14:creationId xmlns:p14="http://schemas.microsoft.com/office/powerpoint/2010/main" val="3146716544"/>
+      </p:ext>
+    </p:extLst>
+  </p:cSld>
+  <p:clrMapOvr>
+    <a:masterClrMapping/>
+  </p:clrMapOvr>
+</p:sld>
+</file>
+
+<file path=ppt/slides/slide14.xml><?xml version="1.0" encoding="utf-8"?>
+<p:sld xmlns:a="http://schemas.openxmlformats.org/drawingml/2006/main" xmlns:r="http://schemas.openxmlformats.org/officeDocument/2006/relationships" xmlns:p="http://schemas.openxmlformats.org/presentationml/2006/main">
+  <p:cSld>
+    <p:bg>
+      <p:bgPr>
+        <a:blipFill rotWithShape="1">
+          <a:blip r:embed="rId2">
+            <a:duotone>
+              <a:schemeClr val="bg1">
+                <a:shade val="80000"/>
+                <a:lumMod val="80000"/>
+              </a:schemeClr>
+              <a:schemeClr val="bg1">
+                <a:tint val="98000"/>
+              </a:schemeClr>
+            </a:duotone>
+          </a:blip>
+          <a:stretch/>
+        </a:blipFill>
+        <a:effectLst/>
+      </p:bgPr>
+    </p:bg>
+    <p:spTree>
+      <p:nvGrpSpPr>
+        <p:cNvPr id="1" name=""/>
+        <p:cNvGrpSpPr/>
+        <p:nvPr/>
+      </p:nvGrpSpPr>
+      <p:grpSpPr>
+        <a:xfrm>
+          <a:off x="0" y="0"/>
+          <a:ext cx="0" cy="0"/>
+          <a:chOff x="0" y="0"/>
+          <a:chExt cx="0" cy="0"/>
+        </a:xfrm>
+      </p:grpSpPr>
+      <p:sp useBgFill="1">
+        <p:nvSpPr>
+          <p:cNvPr id="9" name="Rectangle 8">
+            <a:extLst>
+              <a:ext uri="{FF2B5EF4-FFF2-40B4-BE49-F238E27FC236}">
+                <a16:creationId xmlns:a16="http://schemas.microsoft.com/office/drawing/2014/main" id="{76AAB769-9635-4A0E-8861-BB3FE8396E58}"/>
+              </a:ext>
+              <a:ext uri="{C183D7F6-B498-43B3-948B-1728B52AA6E4}">
+                <adec:decorative xmlns:adec="http://schemas.microsoft.com/office/drawing/2017/decorative" val="1"/>
+              </a:ext>
+            </a:extLst>
+          </p:cNvPr>
+          <p:cNvSpPr>
+            <a:spLocks noGrp="1" noRot="1" noChangeAspect="1" noMove="1" noResize="1" noEditPoints="1" noAdjustHandles="1" noChangeArrowheads="1" noChangeShapeType="1" noTextEdit="1"/>
+          </p:cNvSpPr>
+          <p:nvPr>
+            <p:extLst>
+              <p:ext uri="{386F3935-93C4-4BCD-93E2-E3B085C9AB24}">
+                <p16:designElem xmlns:p16="http://schemas.microsoft.com/office/powerpoint/2015/main" val="1"/>
+              </p:ext>
+            </p:extLst>
+          </p:nvPr>
+        </p:nvSpPr>
+        <p:spPr>
+          <a:xfrm>
+            <a:off x="0" y="0"/>
+            <a:ext cx="12192000" cy="6858000"/>
+          </a:xfrm>
+          <a:prstGeom prst="rect">
+            <a:avLst/>
+          </a:prstGeom>
+          <a:ln>
+            <a:noFill/>
+          </a:ln>
+        </p:spPr>
+        <p:style>
+          <a:lnRef idx="2">
+            <a:schemeClr val="accent1">
+              <a:shade val="50000"/>
+            </a:schemeClr>
+          </a:lnRef>
+          <a:fillRef idx="1">
+            <a:schemeClr val="accent1"/>
+          </a:fillRef>
+          <a:effectRef idx="0">
+            <a:schemeClr val="accent1"/>
+          </a:effectRef>
+          <a:fontRef idx="minor">
+            <a:schemeClr val="lt1"/>
+          </a:fontRef>
+        </p:style>
+        <p:txBody>
+          <a:bodyPr rtlCol="0" anchor="ctr"/>
+          <a:lstStyle/>
+          <a:p>
+            <a:pPr algn="ctr"/>
+            <a:endParaRPr lang="en-US"/>
+          </a:p>
+        </p:txBody>
+      </p:sp>
+      <p:sp>
+        <p:nvSpPr>
+          <p:cNvPr id="2" name="Title 1">
+            <a:extLst>
+              <a:ext uri="{FF2B5EF4-FFF2-40B4-BE49-F238E27FC236}">
+                <a16:creationId xmlns:a16="http://schemas.microsoft.com/office/drawing/2014/main" id="{B892C1E7-D38F-04A9-EEF1-C73E06D5A8D9}"/>
+              </a:ext>
+            </a:extLst>
+          </p:cNvPr>
+          <p:cNvSpPr>
+            <a:spLocks noGrp="1"/>
+          </p:cNvSpPr>
+          <p:nvPr>
+            <p:ph type="title"/>
+          </p:nvPr>
+        </p:nvSpPr>
+        <p:spPr>
+          <a:xfrm>
+            <a:off x="5715299" y="2617381"/>
+            <a:ext cx="5441285" cy="1623238"/>
+          </a:xfrm>
+        </p:spPr>
+        <p:txBody>
+          <a:bodyPr vert="horz" lIns="91440" tIns="45720" rIns="91440" bIns="45720" rtlCol="0" anchor="b">
+            <a:normAutofit/>
+          </a:bodyPr>
+          <a:lstStyle/>
+          <a:p>
+            <a:r>
+              <a:rPr lang="en-US" sz="4400" dirty="0">
+                <a:latin typeface="Consolas" panose="020B0609020204030204" pitchFamily="49" charset="0"/>
+              </a:rPr>
+              <a:t>Variable</a:t>
+            </a:r>
+            <a:r>
+              <a:rPr lang="en-US" sz="3600" dirty="0">
+                <a:latin typeface="Consolas" panose="020B0609020204030204" pitchFamily="49" charset="0"/>
+              </a:rPr>
+              <a:t> </a:t>
+            </a:r>
+            <a:r>
+              <a:rPr lang="en-US" sz="4400" dirty="0">
+                <a:latin typeface="Consolas" panose="020B0609020204030204" pitchFamily="49" charset="0"/>
+              </a:rPr>
+              <a:t>Declaration</a:t>
+            </a:r>
+            <a:endParaRPr lang="en-US" sz="3600" dirty="0">
+              <a:latin typeface="Consolas" panose="020B0609020204030204" pitchFamily="49" charset="0"/>
+            </a:endParaRPr>
+          </a:p>
+        </p:txBody>
+      </p:sp>
+      <p:pic>
+        <p:nvPicPr>
+          <p:cNvPr id="11" name="Picture 10">
+            <a:extLst>
+              <a:ext uri="{FF2B5EF4-FFF2-40B4-BE49-F238E27FC236}">
+                <a16:creationId xmlns:a16="http://schemas.microsoft.com/office/drawing/2014/main" id="{DBF7BBCC-A085-493E-83D9-01D4F8E88929}"/>
+              </a:ext>
+              <a:ext uri="{C183D7F6-B498-43B3-948B-1728B52AA6E4}">
+                <adec:decorative xmlns:adec="http://schemas.microsoft.com/office/drawing/2017/decorative" val="1"/>
+              </a:ext>
+            </a:extLst>
+          </p:cNvPr>
+          <p:cNvPicPr>
+            <a:picLocks noGrp="1" noRot="1" noChangeAspect="1" noMove="1" noResize="1" noEditPoints="1" noAdjustHandles="1" noChangeArrowheads="1" noChangeShapeType="1" noCrop="1"/>
+          </p:cNvPicPr>
+          <p:nvPr>
+            <p:extLst>
+              <p:ext uri="{386F3935-93C4-4BCD-93E2-E3B085C9AB24}">
+                <p16:designElem xmlns:p16="http://schemas.microsoft.com/office/powerpoint/2015/main" val="1"/>
+              </p:ext>
+            </p:extLst>
+          </p:nvPr>
+        </p:nvPicPr>
+        <p:blipFill rotWithShape="1">
+          <a:blip r:embed="rId3">
+            <a:extLst>
+              <a:ext uri="{28A0092B-C50C-407E-A947-70E740481C1C}">
+                <a14:useLocalDpi xmlns:a14="http://schemas.microsoft.com/office/drawing/2010/main" val="0"/>
+              </a:ext>
+            </a:extLst>
+          </a:blip>
+          <a:srcRect t="964" r="2807" b="1446"/>
+          <a:stretch/>
+        </p:blipFill>
+        <p:spPr>
+          <a:xfrm>
+            <a:off x="-10649" y="1"/>
+            <a:ext cx="4690532" cy="6858000"/>
+          </a:xfrm>
+          <a:prstGeom prst="rect">
+            <a:avLst/>
+          </a:prstGeom>
+        </p:spPr>
+      </p:pic>
+      <p:pic>
+        <p:nvPicPr>
+          <p:cNvPr id="5" name="Picture 4" descr="Autoradiogram on white paper">
+            <a:extLst>
+              <a:ext uri="{FF2B5EF4-FFF2-40B4-BE49-F238E27FC236}">
+                <a16:creationId xmlns:a16="http://schemas.microsoft.com/office/drawing/2014/main" id="{7B700904-2DD5-7495-938C-72FD6C8741F2}"/>
+              </a:ext>
+            </a:extLst>
+          </p:cNvPr>
+          <p:cNvPicPr>
+            <a:picLocks noChangeAspect="1"/>
+          </p:cNvPicPr>
+          <p:nvPr/>
+        </p:nvPicPr>
+        <p:blipFill>
+          <a:blip r:embed="rId4"/>
+          <a:srcRect l="29180" r="20824"/>
+          <a:stretch>
+            <a:fillRect/>
+          </a:stretch>
+        </p:blipFill>
+        <p:spPr>
+          <a:xfrm>
+            <a:off x="20" y="10"/>
+            <a:ext cx="4679863" cy="6857990"/>
+          </a:xfrm>
+          <a:prstGeom prst="rect">
+            <a:avLst/>
+          </a:prstGeom>
+        </p:spPr>
+      </p:pic>
+    </p:spTree>
+    <p:extLst>
+      <p:ext uri="{BB962C8B-B14F-4D97-AF65-F5344CB8AC3E}">
+        <p14:creationId xmlns:p14="http://schemas.microsoft.com/office/powerpoint/2010/main" val="177687448"/>
       </p:ext>
     </p:extLst>
   </p:cSld>
@@ -6856,7 +8274,9 @@
           <a:p>
             <a:pPr algn="l"/>
             <a:r>
-              <a:rPr lang="en-US" sz="4000" dirty="0"/>
+              <a:rPr lang="en-US" sz="4000" dirty="0">
+                <a:latin typeface="Consolas" panose="020B0609020204030204" pitchFamily="49" charset="0"/>
+              </a:rPr>
               <a:t>Contents</a:t>
             </a:r>
           </a:p>
@@ -6894,7 +8314,9 @@
               <a:buNone/>
             </a:pPr>
             <a:r>
-              <a:rPr lang="en-US" sz="2400" dirty="0"/>
+              <a:rPr lang="en-US" sz="2400" dirty="0">
+                <a:latin typeface="Consolas" panose="020B0609020204030204" pitchFamily="49" charset="0"/>
+              </a:rPr>
               <a:t>Historical Background of COBOL</a:t>
             </a:r>
           </a:p>
@@ -6903,7 +8325,9 @@
               <a:buNone/>
             </a:pPr>
             <a:r>
-              <a:rPr lang="en-US" sz="2400" dirty="0"/>
+              <a:rPr lang="en-US" sz="2400" dirty="0">
+                <a:latin typeface="Consolas" panose="020B0609020204030204" pitchFamily="49" charset="0"/>
+              </a:rPr>
               <a:t>COBOL Program Structure</a:t>
             </a:r>
           </a:p>
@@ -6912,7 +8336,20 @@
               <a:buNone/>
             </a:pPr>
             <a:r>
-              <a:rPr lang="en-US" sz="2400" dirty="0"/>
+              <a:rPr lang="en-US" sz="2400" dirty="0">
+                <a:latin typeface="Consolas" panose="020B0609020204030204" pitchFamily="49" charset="0"/>
+              </a:rPr>
+              <a:t>COBOL Syntax</a:t>
+            </a:r>
+          </a:p>
+          <a:p>
+            <a:pPr marL="36900" lvl="0" indent="0">
+              <a:buNone/>
+            </a:pPr>
+            <a:r>
+              <a:rPr lang="en-US" sz="2400" dirty="0">
+                <a:latin typeface="Consolas" panose="020B0609020204030204" pitchFamily="49" charset="0"/>
+              </a:rPr>
               <a:t>Explanation of Solution Code (Stack Implementation)</a:t>
             </a:r>
           </a:p>
@@ -7045,8 +8482,8 @@
         </p:nvSpPr>
         <p:spPr>
           <a:xfrm>
-            <a:off x="7947377" y="835383"/>
-            <a:ext cx="3382832" cy="3499549"/>
+            <a:off x="7209696" y="1947672"/>
+            <a:ext cx="3382832" cy="1654978"/>
           </a:xfrm>
         </p:spPr>
         <p:txBody>
@@ -7057,7 +8494,9 @@
           <a:p>
             <a:pPr algn="l"/>
             <a:r>
-              <a:rPr lang="en-US" sz="4200" dirty="0"/>
+              <a:rPr lang="en-US" sz="4200" dirty="0">
+                <a:latin typeface="Consolas" panose="020B0609020204030204" pitchFamily="49" charset="0"/>
+              </a:rPr>
               <a:t>Historical Background</a:t>
             </a:r>
           </a:p>
@@ -7065,33 +8504,49 @@
       </p:sp>
       <p:pic>
         <p:nvPicPr>
-          <p:cNvPr id="5" name="Picture 4" descr="A gold mandala on a red background">
+          <p:cNvPr id="1026" name="Picture 2" descr="COBOL - Wikipedia">
             <a:extLst>
               <a:ext uri="{FF2B5EF4-FFF2-40B4-BE49-F238E27FC236}">
-                <a16:creationId xmlns:a16="http://schemas.microsoft.com/office/drawing/2014/main" id="{53197A5D-EFF5-21B0-657B-142CA44F95CE}"/>
+                <a16:creationId xmlns:a16="http://schemas.microsoft.com/office/drawing/2014/main" id="{AE9DE027-1900-B9DC-EEFC-4614746D0085}"/>
               </a:ext>
             </a:extLst>
           </p:cNvPr>
           <p:cNvPicPr>
-            <a:picLocks noChangeAspect="1"/>
+            <a:picLocks noChangeAspect="1" noChangeArrowheads="1"/>
           </p:cNvPicPr>
           <p:nvPr/>
         </p:nvPicPr>
         <p:blipFill>
-          <a:blip r:embed="rId3"/>
-          <a:srcRect r="17567"/>
+          <a:blip r:embed="rId3">
+            <a:extLst>
+              <a:ext uri="{28A0092B-C50C-407E-A947-70E740481C1C}">
+                <a14:useLocalDpi xmlns:a14="http://schemas.microsoft.com/office/drawing/2010/main" val="0"/>
+              </a:ext>
+            </a:extLst>
+          </a:blip>
+          <a:srcRect/>
           <a:stretch>
             <a:fillRect/>
           </a:stretch>
         </p:blipFill>
-        <p:spPr>
-          <a:xfrm>
-            <a:off x="-1" y="10"/>
-            <a:ext cx="7537704" cy="6857990"/>
+        <p:spPr bwMode="auto">
+          <a:xfrm>
+            <a:off x="0" y="0"/>
+            <a:ext cx="5610225" cy="6858000"/>
           </a:xfrm>
           <a:prstGeom prst="rect">
             <a:avLst/>
           </a:prstGeom>
+          <a:noFill/>
+          <a:extLst>
+            <a:ext uri="{909E8E84-426E-40DD-AFC4-6F175D3DCCD1}">
+              <a14:hiddenFill xmlns:a14="http://schemas.microsoft.com/office/drawing/2010/main">
+                <a:solidFill>
+                  <a:srgbClr val="FFFFFF"/>
+                </a:solidFill>
+              </a14:hiddenFill>
+            </a:ext>
+          </a:extLst>
         </p:spPr>
       </p:pic>
     </p:spTree>
@@ -7232,8 +8687,8 @@
         </p:blipFill>
         <p:spPr bwMode="auto">
           <a:xfrm>
-            <a:off x="-8622" y="10"/>
-            <a:ext cx="6096000" cy="6857990"/>
+            <a:off x="-8623" y="10"/>
+            <a:ext cx="6265647" cy="6857990"/>
           </a:xfrm>
           <a:prstGeom prst="rect">
             <a:avLst/>
@@ -7324,7 +8779,9 @@
           <a:p>
             <a:pPr algn="l"/>
             <a:r>
-              <a:rPr lang="en-PH" sz="3200" dirty="0"/>
+              <a:rPr lang="en-PH" sz="3200" dirty="0">
+                <a:latin typeface="Consolas" panose="020B0609020204030204" pitchFamily="49" charset="0"/>
+              </a:rPr>
               <a:t>Historical Background</a:t>
             </a:r>
           </a:p>
@@ -7354,13 +8811,14 @@
         </p:spPr>
         <p:txBody>
           <a:bodyPr anchor="t">
-            <a:normAutofit/>
+            <a:normAutofit fontScale="92500" lnSpcReduction="10000"/>
           </a:bodyPr>
           <a:lstStyle/>
           <a:p>
             <a:r>
               <a:rPr lang="en-US" sz="1800" dirty="0">
                 <a:effectLst/>
+                <a:latin typeface="Consolas" panose="020B0609020204030204" pitchFamily="49" charset="0"/>
               </a:rPr>
               <a:t>COBOL was developed by the Conference on Data Systems Languages (CODASYL), which formed in 1959. </a:t>
             </a:r>
@@ -7369,6 +8827,7 @@
             <a:r>
               <a:rPr lang="en-US" sz="1800" dirty="0">
                 <a:effectLst/>
+                <a:latin typeface="Consolas" panose="020B0609020204030204" pitchFamily="49" charset="0"/>
               </a:rPr>
               <a:t>Was partly derived from FLOW-MATIC, the first data-processing language to use English-like keywords</a:t>
             </a:r>
@@ -7377,10 +8836,13 @@
             <a:r>
               <a:rPr lang="en-US" sz="1800" dirty="0">
                 <a:effectLst/>
+                <a:latin typeface="Consolas" panose="020B0609020204030204" pitchFamily="49" charset="0"/>
               </a:rPr>
               <a:t>Created by computer science pioneer Dr. Grace Hopper, COBOL was created as part of a US Department of Defense initiative pushing for a programming language that could work across operating systems and hardware environments.</a:t>
             </a:r>
-            <a:endParaRPr lang="en-PH" sz="1800" dirty="0"/>
+            <a:endParaRPr lang="en-PH" sz="1800" dirty="0">
+              <a:latin typeface="Consolas" panose="020B0609020204030204" pitchFamily="49" charset="0"/>
+            </a:endParaRPr>
           </a:p>
         </p:txBody>
       </p:sp>
@@ -7529,7 +8991,9 @@
           <a:p>
             <a:pPr algn="l"/>
             <a:r>
-              <a:rPr lang="en-PH" sz="3600" dirty="0"/>
+              <a:rPr lang="en-PH" sz="3600" dirty="0">
+                <a:latin typeface="Consolas" panose="020B0609020204030204" pitchFamily="49" charset="0"/>
+              </a:rPr>
               <a:t>Historical Background</a:t>
             </a:r>
           </a:p>
@@ -7618,6 +9082,7 @@
             <a:r>
               <a:rPr lang="en-US" dirty="0">
                 <a:effectLst/>
+                <a:latin typeface="Consolas" panose="020B0609020204030204" pitchFamily="49" charset="0"/>
               </a:rPr>
               <a:t>The first version of the COBOL programming language was released in 1960</a:t>
             </a:r>
@@ -7626,6 +9091,7 @@
             <a:r>
               <a:rPr lang="en-US" dirty="0">
                 <a:effectLst/>
+                <a:latin typeface="Consolas" panose="020B0609020204030204" pitchFamily="49" charset="0"/>
               </a:rPr>
               <a:t>It was ultimately standardized as a computer language in 1968 (ISO/IEC 1989). </a:t>
             </a:r>
@@ -7634,10 +9100,13 @@
             <a:r>
               <a:rPr lang="en-US" dirty="0">
                 <a:effectLst/>
+                <a:latin typeface="Consolas" panose="020B0609020204030204" pitchFamily="49" charset="0"/>
               </a:rPr>
               <a:t>Implemented several revisions and modernizations, including COBOL-61, COBOL-68, COBOL-74 and COBOL-85</a:t>
             </a:r>
-            <a:endParaRPr lang="en-PH" dirty="0"/>
+            <a:endParaRPr lang="en-PH" dirty="0">
+              <a:latin typeface="Consolas" panose="020B0609020204030204" pitchFamily="49" charset="0"/>
+            </a:endParaRPr>
           </a:p>
         </p:txBody>
       </p:sp>
@@ -7786,7 +9255,9 @@
           <a:p>
             <a:pPr algn="l"/>
             <a:r>
-              <a:rPr lang="en-PH" sz="3600" dirty="0"/>
+              <a:rPr lang="en-PH" sz="3600" dirty="0">
+                <a:latin typeface="Consolas" panose="020B0609020204030204" pitchFamily="49" charset="0"/>
+              </a:rPr>
               <a:t>Historical Background</a:t>
             </a:r>
           </a:p>
@@ -7868,13 +9339,14 @@
         </p:spPr>
         <p:txBody>
           <a:bodyPr anchor="ctr">
-            <a:normAutofit/>
+            <a:normAutofit fontScale="92500"/>
           </a:bodyPr>
           <a:lstStyle/>
           <a:p>
             <a:r>
               <a:rPr lang="en-US" dirty="0">
                 <a:effectLst/>
+                <a:latin typeface="Consolas" panose="020B0609020204030204" pitchFamily="49" charset="0"/>
               </a:rPr>
               <a:t>COBOL 2002 aimed to make COBOL applications more compatible with modern software development practices by introducing object-oriented features</a:t>
             </a:r>
@@ -7883,18 +9355,21 @@
             <a:r>
               <a:rPr lang="en-US" dirty="0">
                 <a:effectLst/>
+                <a:latin typeface="Consolas" panose="020B0609020204030204" pitchFamily="49" charset="0"/>
               </a:rPr>
               <a:t>COBOL 14 introduced new changes, including replacing portable arithmetic results with </a:t>
             </a:r>
             <a:r>
               <a:rPr lang="en-US" u="sng" dirty="0">
                 <a:effectLst/>
+                <a:latin typeface="Consolas" panose="020B0609020204030204" pitchFamily="49" charset="0"/>
               </a:rPr>
               <a:t>IEEE 754</a:t>
             </a:r>
             <a:r>
               <a:rPr lang="en-US" dirty="0">
                 <a:effectLst/>
+                <a:latin typeface="Consolas" panose="020B0609020204030204" pitchFamily="49" charset="0"/>
               </a:rPr>
               <a:t> data types</a:t>
             </a:r>
@@ -7903,10 +9378,13 @@
             <a:r>
               <a:rPr lang="en-US" dirty="0">
                 <a:effectLst/>
+                <a:latin typeface="Consolas" panose="020B0609020204030204" pitchFamily="49" charset="0"/>
               </a:rPr>
               <a:t>The latest standard, COBOL 2023, delivered additional new features focused on improving COBOL's interoperability with modern systems</a:t>
             </a:r>
-            <a:endParaRPr lang="en-PH" dirty="0"/>
+            <a:endParaRPr lang="en-PH" dirty="0">
+              <a:latin typeface="Consolas" panose="020B0609020204030204" pitchFamily="49" charset="0"/>
+            </a:endParaRPr>
           </a:p>
         </p:txBody>
       </p:sp>
@@ -8048,7 +9526,9 @@
           <a:lstStyle/>
           <a:p>
             <a:r>
-              <a:rPr lang="en-US" sz="4800" dirty="0"/>
+              <a:rPr lang="en-US" sz="4800" dirty="0">
+                <a:latin typeface="Consolas" panose="020B0609020204030204" pitchFamily="49" charset="0"/>
+              </a:rPr>
               <a:t>COBOL Program Structure</a:t>
             </a:r>
           </a:p>
@@ -8801,7 +10281,9 @@
           <a:p>
             <a:pPr algn="l"/>
             <a:r>
-              <a:rPr lang="en-PH" dirty="0"/>
+              <a:rPr lang="en-PH" dirty="0">
+                <a:latin typeface="Consolas" panose="020B0609020204030204" pitchFamily="49" charset="0"/>
+              </a:rPr>
               <a:t>Program Structure</a:t>
             </a:r>
           </a:p>
@@ -8870,7 +10352,7 @@
         </p:spPr>
         <p:txBody>
           <a:bodyPr>
-            <a:normAutofit lnSpcReduction="10000"/>
+            <a:normAutofit fontScale="92500" lnSpcReduction="10000"/>
           </a:bodyPr>
           <a:lstStyle/>
           <a:p>
@@ -8882,6 +10364,7 @@
             <a:r>
               <a:rPr lang="en-PH" sz="2000" dirty="0">
                 <a:effectLst/>
+                <a:latin typeface="Consolas" panose="020B0609020204030204" pitchFamily="49" charset="0"/>
               </a:rPr>
               <a:t>COBOL has a hierarchical structure that comprises divisions, sections, paragraphs, sentences, verbs and character strings.</a:t>
             </a:r>
@@ -8895,6 +10378,7 @@
             <a:r>
               <a:rPr lang="en-US" sz="2000" dirty="0">
                 <a:effectLst/>
+                <a:latin typeface="Consolas" panose="020B0609020204030204" pitchFamily="49" charset="0"/>
               </a:rPr>
               <a:t>The divisional nature of a COBOL system (which comprises four divisions) enables a distinct separation of concerns within COBOL programs</a:t>
             </a:r>
@@ -8908,6 +10392,7 @@
             <a:r>
               <a:rPr lang="en-US" sz="2000" dirty="0">
                 <a:effectLst/>
+                <a:latin typeface="Consolas" panose="020B0609020204030204" pitchFamily="49" charset="0"/>
               </a:rPr>
               <a:t>COBOL divisions are as follows:</a:t>
             </a:r>
@@ -8921,6 +10406,7 @@
             <a:r>
               <a:rPr lang="en-US" sz="2000" dirty="0">
                 <a:effectLst/>
+                <a:latin typeface="Consolas" panose="020B0609020204030204" pitchFamily="49" charset="0"/>
               </a:rPr>
               <a:t>Identification division</a:t>
             </a:r>
@@ -8934,6 +10420,7 @@
             <a:r>
               <a:rPr lang="en-US" sz="2000" dirty="0">
                 <a:effectLst/>
+                <a:latin typeface="Consolas" panose="020B0609020204030204" pitchFamily="49" charset="0"/>
               </a:rPr>
               <a:t>Environment division</a:t>
             </a:r>
@@ -8947,6 +10434,7 @@
             <a:r>
               <a:rPr lang="en-US" sz="2000" dirty="0">
                 <a:effectLst/>
+                <a:latin typeface="Consolas" panose="020B0609020204030204" pitchFamily="49" charset="0"/>
               </a:rPr>
               <a:t>Data division</a:t>
             </a:r>
@@ -8960,10 +10448,13 @@
             <a:r>
               <a:rPr lang="en-US" sz="2000" dirty="0">
                 <a:effectLst/>
+                <a:latin typeface="Consolas" panose="020B0609020204030204" pitchFamily="49" charset="0"/>
               </a:rPr>
               <a:t>Procedure division</a:t>
             </a:r>
-            <a:endParaRPr lang="en-PH" sz="2000" dirty="0"/>
+            <a:endParaRPr lang="en-PH" sz="2000" dirty="0">
+              <a:latin typeface="Consolas" panose="020B0609020204030204" pitchFamily="49" charset="0"/>
+            </a:endParaRPr>
           </a:p>
         </p:txBody>
       </p:sp>
@@ -9094,8 +10585,8 @@
         </p:nvSpPr>
         <p:spPr>
           <a:xfrm>
-            <a:off x="834013" y="1115568"/>
-            <a:ext cx="3487616" cy="4626864"/>
+            <a:off x="751716" y="1115568"/>
+            <a:ext cx="3820587" cy="4626864"/>
           </a:xfrm>
         </p:spPr>
         <p:txBody>
@@ -9106,7 +10597,9 @@
           <a:p>
             <a:pPr algn="l"/>
             <a:r>
-              <a:rPr lang="en-PH" sz="3600" dirty="0"/>
+              <a:rPr lang="en-PH" sz="3600" dirty="0">
+                <a:latin typeface="Consolas" panose="020B0609020204030204" pitchFamily="49" charset="0"/>
+              </a:rPr>
               <a:t>Identification Division</a:t>
             </a:r>
           </a:p>
@@ -9195,6 +10688,7 @@
             <a:r>
               <a:rPr lang="en-US" dirty="0">
                 <a:effectLst/>
+                <a:latin typeface="Consolas" panose="020B0609020204030204" pitchFamily="49" charset="0"/>
               </a:rPr>
               <a:t>is the first division of a COBOL program, and is mandatory</a:t>
             </a:r>
@@ -9203,6 +10697,7 @@
             <a:r>
               <a:rPr lang="en-US" dirty="0">
                 <a:effectLst/>
+                <a:latin typeface="Consolas" panose="020B0609020204030204" pitchFamily="49" charset="0"/>
               </a:rPr>
               <a:t>assigns the program a name and provides other identification information like author, date written and a brief description of the program's purpose</a:t>
             </a:r>
@@ -9211,10 +10706,13 @@
             <a:r>
               <a:rPr lang="en-US" dirty="0">
                 <a:effectLst/>
+                <a:latin typeface="Consolas" panose="020B0609020204030204" pitchFamily="49" charset="0"/>
               </a:rPr>
               <a:t>COBOL programs need a PROGRAM-ID paragraph to function within the identification division</a:t>
             </a:r>
-            <a:endParaRPr lang="en-PH" dirty="0"/>
+            <a:endParaRPr lang="en-PH" dirty="0">
+              <a:latin typeface="Consolas" panose="020B0609020204030204" pitchFamily="49" charset="0"/>
+            </a:endParaRPr>
           </a:p>
         </p:txBody>
       </p:sp>

</xml_diff>